<commit_message>
The final version of the ISSTA talk - few minor changes to the July 5th version
</commit_message>
<xml_diff>
--- a/issta-2007/talk/issta-2007.pptx
+++ b/issta-2007/talk/issta-2007.pptx
@@ -5,7 +5,7 @@
     <p:sldMasterId id="2147483649" r:id="rId1"/>
   </p:sldMasterIdLst>
   <p:notesMasterIdLst>
-    <p:notesMasterId r:id="rId26"/>
+    <p:notesMasterId r:id="rId27"/>
   </p:notesMasterIdLst>
   <p:sldIdLst>
     <p:sldId id="257" r:id="rId2"/>
@@ -32,6 +32,7 @@
     <p:sldId id="280" r:id="rId23"/>
     <p:sldId id="281" r:id="rId24"/>
     <p:sldId id="282" r:id="rId25"/>
+    <p:sldId id="288" r:id="rId26"/>
   </p:sldIdLst>
   <p:sldSz cx="9144000" cy="6858000" type="screen4x3"/>
   <p:notesSz cx="6858000" cy="9144000"/>
@@ -3279,14 +3280,6 @@
           </a:bodyPr>
           <a:lstStyle/>
           <a:p>
-            <a:r>
-              <a:rPr lang="en-US" dirty="0" smtClean="0"/>
-              <a:t>Bounds for disjunctions are dual</a:t>
-            </a:r>
-            <a:r>
-              <a:rPr lang="en-US" baseline="0" dirty="0" smtClean="0"/>
-              <a:t> to those of conjunctions</a:t>
-            </a:r>
             <a:endParaRPr lang="en-US" dirty="0"/>
           </a:p>
         </p:txBody>
@@ -3854,34 +3847,8 @@
           <a:bodyPr/>
           <a:lstStyle/>
           <a:p>
-            <a:pPr marL="0" marR="0" indent="0" algn="l" defTabSz="914400" rtl="0" eaLnBrk="1" fontAlgn="base" latinLnBrk="0" hangingPunct="1">
-              <a:lnSpc>
-                <a:spcPct val="100000"/>
-              </a:lnSpc>
-              <a:spcBef>
-                <a:spcPct val="30000"/>
-              </a:spcBef>
-              <a:spcAft>
-                <a:spcPct val="0"/>
-              </a:spcAft>
-              <a:buClrTx/>
-              <a:buSzTx/>
-              <a:buFontTx/>
-              <a:buNone/>
-              <a:tabLst/>
-              <a:defRPr/>
-            </a:pPr>
-            <a:r>
-              <a:rPr lang="en-US" dirty="0" smtClean="0"/>
-              <a:t>In-house testing is not always complete</a:t>
-            </a:r>
-          </a:p>
-          <a:p>
-            <a:endParaRPr lang="en-US" dirty="0" smtClean="0"/>
-          </a:p>
-          <a:p>
-            <a:r>
-              <a:rPr lang="en-US" dirty="0" smtClean="0"/>
+            <a:r>
+              <a:rPr lang="en-US" smtClean="0"/>
               <a:t>Windows </a:t>
             </a:r>
             <a:r>
@@ -4347,6 +4314,96 @@
 </p:notes>
 </file>
 
+<file path=ppt/notesSlides/notesSlide25.xml><?xml version="1.0" encoding="utf-8"?>
+<p:notes xmlns:a="http://schemas.openxmlformats.org/drawingml/2006/main" xmlns:r="http://schemas.openxmlformats.org/officeDocument/2006/relationships" xmlns:p="http://schemas.openxmlformats.org/presentationml/2006/main">
+  <p:cSld>
+    <p:spTree>
+      <p:nvGrpSpPr>
+        <p:cNvPr id="1" name=""/>
+        <p:cNvGrpSpPr/>
+        <p:nvPr/>
+      </p:nvGrpSpPr>
+      <p:grpSpPr>
+        <a:xfrm>
+          <a:off x="0" y="0"/>
+          <a:ext cx="0" cy="0"/>
+          <a:chOff x="0" y="0"/>
+          <a:chExt cx="0" cy="0"/>
+        </a:xfrm>
+      </p:grpSpPr>
+      <p:sp>
+        <p:nvSpPr>
+          <p:cNvPr id="2" name="Slide Image Placeholder 1"/>
+          <p:cNvSpPr>
+            <a:spLocks noGrp="1" noRot="1" noChangeAspect="1"/>
+          </p:cNvSpPr>
+          <p:nvPr>
+            <p:ph type="sldImg"/>
+          </p:nvPr>
+        </p:nvSpPr>
+        <p:spPr/>
+      </p:sp>
+      <p:sp>
+        <p:nvSpPr>
+          <p:cNvPr id="3" name="Notes Placeholder 2"/>
+          <p:cNvSpPr>
+            <a:spLocks noGrp="1"/>
+          </p:cNvSpPr>
+          <p:nvPr>
+            <p:ph type="body" idx="1"/>
+          </p:nvPr>
+        </p:nvSpPr>
+        <p:spPr/>
+        <p:txBody>
+          <a:bodyPr>
+            <a:normAutofit/>
+          </a:bodyPr>
+          <a:lstStyle/>
+          <a:p>
+            <a:r>
+              <a:rPr lang="en-US" dirty="0" smtClean="0"/>
+              <a:t>Bounds for disjunctions are dual</a:t>
+            </a:r>
+            <a:r>
+              <a:rPr lang="en-US" baseline="0" dirty="0" smtClean="0"/>
+              <a:t> to those of conjunctions</a:t>
+            </a:r>
+            <a:endParaRPr lang="en-US" dirty="0"/>
+          </a:p>
+        </p:txBody>
+      </p:sp>
+      <p:sp>
+        <p:nvSpPr>
+          <p:cNvPr id="4" name="Slide Number Placeholder 3"/>
+          <p:cNvSpPr>
+            <a:spLocks noGrp="1"/>
+          </p:cNvSpPr>
+          <p:nvPr>
+            <p:ph type="sldNum" sz="quarter" idx="10"/>
+          </p:nvPr>
+        </p:nvSpPr>
+        <p:spPr/>
+        <p:txBody>
+          <a:bodyPr/>
+          <a:lstStyle/>
+          <a:p>
+            <a:fld id="{F24DD582-A67E-40A0-AF49-F9C24728C6A9}" type="slidenum">
+              <a:rPr lang="en-US" smtClean="0"/>
+              <a:pPr/>
+              <a:t>25</a:t>
+            </a:fld>
+            <a:endParaRPr lang="en-US" dirty="0"/>
+          </a:p>
+        </p:txBody>
+      </p:sp>
+    </p:spTree>
+  </p:cSld>
+  <p:clrMapOvr>
+    <a:masterClrMapping/>
+  </p:clrMapOvr>
+</p:notes>
+</file>
+
 <file path=ppt/notesSlides/notesSlide3.xml><?xml version="1.0" encoding="utf-8"?>
 <p:notes xmlns:a="http://schemas.openxmlformats.org/drawingml/2006/main" xmlns:r="http://schemas.openxmlformats.org/officeDocument/2006/relationships" xmlns:p="http://schemas.openxmlformats.org/presentationml/2006/main">
   <p:cSld>
@@ -4732,8 +4789,28 @@
           <a:lstStyle/>
           <a:p>
             <a:r>
+              <a:rPr lang="en-US" baseline="0" dirty="0" smtClean="0"/>
+              <a:t>2. Collapse: compact the feedback report</a:t>
+            </a:r>
+          </a:p>
+          <a:p>
+            <a:r>
+              <a:rPr lang="en-US" baseline="0" dirty="0" smtClean="0"/>
+              <a:t>Sampling: reduce overhead – statistically fair random sample of the events</a:t>
+            </a:r>
+            <a:endParaRPr lang="en-US" dirty="0" smtClean="0"/>
+          </a:p>
+          <a:p>
+            <a:endParaRPr lang="en-US" baseline="0" dirty="0" smtClean="0"/>
+          </a:p>
+          <a:p>
+            <a:r>
+              <a:rPr lang="en-US" baseline="0" dirty="0" smtClean="0"/>
+              <a:t>3. </a:t>
+            </a:r>
+            <a:r>
               <a:rPr lang="en-US" dirty="0" smtClean="0"/>
-              <a:t>2. Predicates at same location: conjunction easily</a:t>
+              <a:t>Predicates at same location: conjunction easily</a:t>
             </a:r>
             <a:r>
               <a:rPr lang="en-US" baseline="0" dirty="0" smtClean="0"/>
@@ -4745,22 +4822,6 @@
               <a:rPr lang="en-US" baseline="0" dirty="0" smtClean="0"/>
               <a:t>Different location: It is not clear what a conjunction means.</a:t>
             </a:r>
-          </a:p>
-          <a:p>
-            <a:endParaRPr lang="en-US" baseline="0" dirty="0" smtClean="0"/>
-          </a:p>
-          <a:p>
-            <a:r>
-              <a:rPr lang="en-US" baseline="0" dirty="0" smtClean="0"/>
-              <a:t>3. Collapse: compact the feedback report</a:t>
-            </a:r>
-          </a:p>
-          <a:p>
-            <a:r>
-              <a:rPr lang="en-US" baseline="0" dirty="0" smtClean="0"/>
-              <a:t>Sampling: reduce overhead – statistically fair random sample of the events</a:t>
-            </a:r>
-            <a:endParaRPr lang="en-US" dirty="0"/>
           </a:p>
         </p:txBody>
       </p:sp>
@@ -15576,51 +15637,8 @@
           <a:lstStyle/>
           <a:p>
             <a:r>
-              <a:rPr lang="en-US" dirty="0" smtClean="0">
-                <a:latin typeface="Cambria Math"/>
-                <a:ea typeface="Cambria Math"/>
-              </a:rPr>
-              <a:t>↓</a:t>
-            </a:r>
-            <a:r>
-              <a:rPr lang="en-US" dirty="0" smtClean="0">
-                <a:solidFill>
-                  <a:schemeClr val="accent2"/>
-                </a:solidFill>
-              </a:rPr>
-              <a:t>F(</a:t>
-            </a:r>
-            <a:r>
-              <a:rPr lang="en-US" i="1" dirty="0" smtClean="0">
-                <a:solidFill>
-                  <a:schemeClr val="accent2"/>
-                </a:solidFill>
-              </a:rPr>
-              <a:t>C</a:t>
-            </a:r>
-            <a:r>
-              <a:rPr lang="en-US" dirty="0" smtClean="0">
-                <a:solidFill>
-                  <a:schemeClr val="accent2"/>
-                </a:solidFill>
-              </a:rPr>
-              <a:t> </a:t>
-            </a:r>
-            <a:r>
-              <a:rPr lang="en-US" i="1" dirty="0" err="1" smtClean="0">
-                <a:solidFill>
-                  <a:schemeClr val="accent2"/>
-                </a:solidFill>
-              </a:rPr>
-              <a:t>obs</a:t>
-            </a:r>
-            <a:r>
-              <a:rPr lang="en-US" dirty="0" smtClean="0">
-                <a:solidFill>
-                  <a:schemeClr val="accent2"/>
-                </a:solidFill>
-              </a:rPr>
-              <a:t>)</a:t>
+              <a:rPr lang="en-US" dirty="0" smtClean="0"/>
+              <a:t>Pruning Conclusion</a:t>
             </a:r>
             <a:endParaRPr lang="en-US" dirty="0"/>
           </a:p>
@@ -15645,6 +15663,1752 @@
               <a:rPr lang="en-US" smtClean="0"/>
               <a:pPr/>
               <a:t>15</a:t>
+            </a:fld>
+            <a:endParaRPr lang="en-US" dirty="0"/>
+          </a:p>
+        </p:txBody>
+      </p:sp>
+      <p:sp>
+        <p:nvSpPr>
+          <p:cNvPr id="46" name="Content Placeholder 2"/>
+          <p:cNvSpPr>
+            <a:spLocks noGrp="1"/>
+          </p:cNvSpPr>
+          <p:nvPr>
+            <p:ph idx="1"/>
+          </p:nvPr>
+        </p:nvSpPr>
+        <p:spPr>
+          <a:xfrm>
+            <a:off x="685800" y="1676400"/>
+            <a:ext cx="7772400" cy="4419600"/>
+          </a:xfrm>
+        </p:spPr>
+        <p:txBody>
+          <a:bodyPr>
+            <a:normAutofit lnSpcReduction="10000"/>
+          </a:bodyPr>
+          <a:lstStyle/>
+          <a:p>
+            <a:pPr lvl="0"/>
+            <a:r>
+              <a:rPr lang="en-US" dirty="0" smtClean="0">
+                <a:ea typeface="Cambria Math"/>
+              </a:rPr>
+              <a:t>Refer to paper for</a:t>
+            </a:r>
+            <a:endParaRPr lang="en-US" dirty="0">
+              <a:ea typeface="Cambria Math"/>
+            </a:endParaRPr>
+          </a:p>
+          <a:p>
+            <a:pPr lvl="1"/>
+            <a:r>
+              <a:rPr lang="en-US" dirty="0" smtClean="0">
+                <a:latin typeface="Cambria Math"/>
+                <a:ea typeface="Cambria Math"/>
+              </a:rPr>
+              <a:t>↓</a:t>
+            </a:r>
+            <a:r>
+              <a:rPr lang="en-US" dirty="0" smtClean="0">
+                <a:solidFill>
+                  <a:schemeClr val="accent2"/>
+                </a:solidFill>
+              </a:rPr>
+              <a:t>F(</a:t>
+            </a:r>
+            <a:r>
+              <a:rPr lang="en-US" i="1" dirty="0" smtClean="0">
+                <a:solidFill>
+                  <a:schemeClr val="accent2"/>
+                </a:solidFill>
+              </a:rPr>
+              <a:t>C</a:t>
+            </a:r>
+            <a:r>
+              <a:rPr lang="en-US" dirty="0" smtClean="0">
+                <a:solidFill>
+                  <a:schemeClr val="accent2"/>
+                </a:solidFill>
+              </a:rPr>
+              <a:t> </a:t>
+            </a:r>
+            <a:r>
+              <a:rPr lang="en-US" i="1" dirty="0" err="1" smtClean="0">
+                <a:solidFill>
+                  <a:schemeClr val="accent2"/>
+                </a:solidFill>
+              </a:rPr>
+              <a:t>obs</a:t>
+            </a:r>
+            <a:r>
+              <a:rPr lang="en-US" dirty="0" smtClean="0">
+                <a:solidFill>
+                  <a:schemeClr val="accent2"/>
+                </a:solidFill>
+              </a:rPr>
+              <a:t>)</a:t>
+            </a:r>
+            <a:endParaRPr lang="en-US" dirty="0" smtClean="0">
+              <a:ea typeface="Cambria Math"/>
+            </a:endParaRPr>
+          </a:p>
+          <a:p>
+            <a:pPr lvl="1"/>
+            <a:r>
+              <a:rPr lang="en-US" dirty="0" smtClean="0">
+                <a:ea typeface="Cambria Math"/>
+              </a:rPr>
+              <a:t>All four bounds for disjunctions</a:t>
+            </a:r>
+          </a:p>
+          <a:p>
+            <a:r>
+              <a:rPr lang="en-US" dirty="0" smtClean="0">
+                <a:ea typeface="Cambria Math"/>
+              </a:rPr>
+              <a:t>Recap:</a:t>
+            </a:r>
+          </a:p>
+          <a:p>
+            <a:pPr lvl="1"/>
+            <a:r>
+              <a:rPr lang="en-US" dirty="0" smtClean="0">
+                <a:ea typeface="Cambria Math"/>
+              </a:rPr>
+              <a:t>Compute upper bound </a:t>
+            </a:r>
+            <a:r>
+              <a:rPr lang="en-US" dirty="0" smtClean="0">
+                <a:ea typeface="Cambria Math"/>
+              </a:rPr>
+              <a:t>on the score of </a:t>
+            </a:r>
+            <a:r>
+              <a:rPr lang="en-US" i="1" dirty="0" smtClean="0">
+                <a:solidFill>
+                  <a:schemeClr val="accent2"/>
+                </a:solidFill>
+              </a:rPr>
+              <a:t>C</a:t>
+            </a:r>
+          </a:p>
+          <a:p>
+            <a:pPr lvl="1"/>
+            <a:r>
+              <a:rPr lang="en-US" dirty="0" smtClean="0">
+                <a:ea typeface="Cambria Math"/>
+              </a:rPr>
+              <a:t>If upper bound &gt; </a:t>
+            </a:r>
+            <a:r>
+              <a:rPr lang="en-US" i="1" dirty="0" smtClean="0">
+                <a:ea typeface="Cambria Math"/>
+              </a:rPr>
+              <a:t>threshold</a:t>
+            </a:r>
+            <a:r>
+              <a:rPr lang="en-US" dirty="0" smtClean="0">
+                <a:ea typeface="Cambria Math"/>
+              </a:rPr>
+              <a:t>:</a:t>
+            </a:r>
+          </a:p>
+          <a:p>
+            <a:pPr lvl="2"/>
+            <a:r>
+              <a:rPr lang="en-US" dirty="0" smtClean="0">
+                <a:ea typeface="Cambria Math"/>
+              </a:rPr>
+              <a:t>Apply truth tables and compute exact values of </a:t>
+            </a:r>
+            <a:r>
+              <a:rPr lang="en-US" dirty="0" smtClean="0">
+                <a:solidFill>
+                  <a:schemeClr val="accent2"/>
+                </a:solidFill>
+              </a:rPr>
+              <a:t>F(C)</a:t>
+            </a:r>
+            <a:r>
+              <a:rPr lang="en-US" dirty="0" smtClean="0">
+                <a:ea typeface="Cambria Math"/>
+              </a:rPr>
+              <a:t> etc.</a:t>
+            </a:r>
+          </a:p>
+          <a:p>
+            <a:pPr lvl="2"/>
+            <a:r>
+              <a:rPr lang="en-US" dirty="0" smtClean="0">
+                <a:ea typeface="Cambria Math"/>
+              </a:rPr>
+              <a:t>Apply score formula</a:t>
+            </a:r>
+            <a:endParaRPr lang="en-US" dirty="0" smtClean="0"/>
+          </a:p>
+        </p:txBody>
+      </p:sp>
+    </p:spTree>
+  </p:cSld>
+  <p:clrMapOvr>
+    <a:masterClrMapping/>
+  </p:clrMapOvr>
+  <p:transition/>
+  <p:timing>
+    <p:tnLst>
+      <p:par>
+        <p:cTn id="1" dur="indefinite" restart="never" nodeType="tmRoot"/>
+      </p:par>
+    </p:tnLst>
+  </p:timing>
+</p:sld>
+</file>
+
+<file path=ppt/slides/slide16.xml><?xml version="1.0" encoding="utf-8"?>
+<p:sld xmlns:a="http://schemas.openxmlformats.org/drawingml/2006/main" xmlns:r="http://schemas.openxmlformats.org/officeDocument/2006/relationships" xmlns:p="http://schemas.openxmlformats.org/presentationml/2006/main">
+  <p:cSld>
+    <p:spTree>
+      <p:nvGrpSpPr>
+        <p:cNvPr id="1" name=""/>
+        <p:cNvGrpSpPr/>
+        <p:nvPr/>
+      </p:nvGrpSpPr>
+      <p:grpSpPr>
+        <a:xfrm>
+          <a:off x="0" y="0"/>
+          <a:ext cx="0" cy="0"/>
+          <a:chOff x="0" y="0"/>
+          <a:chExt cx="0" cy="0"/>
+        </a:xfrm>
+      </p:grpSpPr>
+      <p:sp>
+        <p:nvSpPr>
+          <p:cNvPr id="2" name="Title 1"/>
+          <p:cNvSpPr>
+            <a:spLocks noGrp="1"/>
+          </p:cNvSpPr>
+          <p:nvPr>
+            <p:ph type="title"/>
+          </p:nvPr>
+        </p:nvSpPr>
+        <p:spPr/>
+        <p:txBody>
+          <a:bodyPr/>
+          <a:lstStyle/>
+          <a:p>
+            <a:r>
+              <a:rPr lang="en-US" dirty="0" smtClean="0"/>
+              <a:t>Usability</a:t>
+            </a:r>
+            <a:endParaRPr lang="en-US" dirty="0"/>
+          </a:p>
+        </p:txBody>
+      </p:sp>
+      <p:sp>
+        <p:nvSpPr>
+          <p:cNvPr id="3" name="Content Placeholder 2"/>
+          <p:cNvSpPr>
+            <a:spLocks noGrp="1"/>
+          </p:cNvSpPr>
+          <p:nvPr>
+            <p:ph idx="1"/>
+          </p:nvPr>
+        </p:nvSpPr>
+        <p:spPr/>
+        <p:txBody>
+          <a:bodyPr>
+            <a:normAutofit fontScale="92500" lnSpcReduction="10000"/>
+          </a:bodyPr>
+          <a:lstStyle/>
+          <a:p>
+            <a:r>
+              <a:rPr lang="en-US" dirty="0" smtClean="0"/>
+              <a:t>Numerous predicates trouble programmer</a:t>
+            </a:r>
+          </a:p>
+          <a:p>
+            <a:pPr lvl="1"/>
+            <a:r>
+              <a:rPr lang="en-US" dirty="0" smtClean="0"/>
+              <a:t>Has to infer predicate relations</a:t>
+            </a:r>
+          </a:p>
+          <a:p>
+            <a:pPr lvl="1"/>
+            <a:r>
+              <a:rPr lang="en-US" dirty="0" smtClean="0"/>
+              <a:t>Will prefer </a:t>
+            </a:r>
+            <a:r>
+              <a:rPr lang="en-US" dirty="0" smtClean="0">
+                <a:latin typeface="Cambria Math"/>
+                <a:ea typeface="Cambria Math"/>
+              </a:rPr>
+              <a:t>∧</a:t>
+            </a:r>
+            <a:r>
+              <a:rPr lang="en-US" dirty="0" smtClean="0"/>
+              <a:t> or </a:t>
+            </a:r>
+            <a:r>
+              <a:rPr lang="en-US" dirty="0" smtClean="0">
+                <a:latin typeface="Cambria Math"/>
+                <a:ea typeface="Cambria Math"/>
+              </a:rPr>
+              <a:t>∨ </a:t>
+            </a:r>
+            <a:r>
+              <a:rPr lang="en-US" dirty="0" smtClean="0"/>
+              <a:t>of </a:t>
+            </a:r>
+            <a:r>
+              <a:rPr lang="en-US" i="1" dirty="0" smtClean="0"/>
+              <a:t>related</a:t>
+            </a:r>
+            <a:r>
+              <a:rPr lang="en-US" dirty="0" smtClean="0"/>
+              <a:t> predicates</a:t>
+            </a:r>
+          </a:p>
+          <a:p>
+            <a:pPr marL="342900" lvl="1" indent="-342900">
+              <a:spcBef>
+                <a:spcPct val="70000"/>
+              </a:spcBef>
+              <a:buFontTx/>
+              <a:buChar char="•"/>
+            </a:pPr>
+            <a:r>
+              <a:rPr lang="en-US" i="1" dirty="0" smtClean="0"/>
+              <a:t>effort</a:t>
+            </a:r>
+            <a:r>
+              <a:rPr lang="en-US" dirty="0" smtClean="0"/>
+              <a:t>(</a:t>
+            </a:r>
+            <a:r>
+              <a:rPr lang="en-US" i="1" dirty="0" smtClean="0"/>
+              <a:t>p</a:t>
+            </a:r>
+            <a:r>
+              <a:rPr lang="en-US" baseline="-25000" dirty="0" smtClean="0"/>
+              <a:t>1</a:t>
+            </a:r>
+            <a:r>
+              <a:rPr lang="en-US" dirty="0" smtClean="0"/>
+              <a:t>, </a:t>
+            </a:r>
+            <a:r>
+              <a:rPr lang="en-US" i="1" dirty="0" smtClean="0"/>
+              <a:t>p</a:t>
+            </a:r>
+            <a:r>
+              <a:rPr lang="en-US" baseline="-25000" dirty="0" smtClean="0"/>
+              <a:t>2</a:t>
+            </a:r>
+            <a:r>
+              <a:rPr lang="en-US" dirty="0" smtClean="0"/>
+              <a:t>) = proximity of </a:t>
+            </a:r>
+            <a:r>
+              <a:rPr lang="en-US" i="1" dirty="0" smtClean="0"/>
+              <a:t>p</a:t>
+            </a:r>
+            <a:r>
+              <a:rPr lang="en-US" baseline="-25000" dirty="0" smtClean="0"/>
+              <a:t>1</a:t>
+            </a:r>
+            <a:r>
+              <a:rPr lang="en-US" dirty="0" smtClean="0"/>
+              <a:t>and </a:t>
+            </a:r>
+            <a:r>
+              <a:rPr lang="en-US" i="1" dirty="0" smtClean="0"/>
+              <a:t>p</a:t>
+            </a:r>
+            <a:r>
+              <a:rPr lang="en-US" baseline="-25000" dirty="0" smtClean="0"/>
+              <a:t>2</a:t>
+            </a:r>
+            <a:r>
+              <a:rPr lang="en-US" dirty="0" smtClean="0"/>
+              <a:t> in PDG</a:t>
+            </a:r>
+          </a:p>
+          <a:p>
+            <a:pPr lvl="1"/>
+            <a:r>
+              <a:rPr lang="en-US" dirty="0" smtClean="0">
+                <a:solidFill>
+                  <a:srgbClr val="000000"/>
+                </a:solidFill>
+              </a:rPr>
+              <a:t>Fraction of entire program</a:t>
+            </a:r>
+          </a:p>
+          <a:p>
+            <a:pPr lvl="1"/>
+            <a:r>
+              <a:rPr lang="en-US" dirty="0" smtClean="0"/>
+              <a:t>PDG = CDG </a:t>
+            </a:r>
+            <a:r>
+              <a:rPr lang="en-US" dirty="0" smtClean="0">
+                <a:latin typeface="Cambria Math"/>
+                <a:ea typeface="Cambria Math"/>
+              </a:rPr>
+              <a:t>∪ D</a:t>
+            </a:r>
+            <a:r>
+              <a:rPr lang="en-US" dirty="0" smtClean="0"/>
+              <a:t>DG</a:t>
+            </a:r>
+          </a:p>
+          <a:p>
+            <a:pPr lvl="1"/>
+            <a:r>
+              <a:rPr lang="en-US" dirty="0" smtClean="0">
+                <a:solidFill>
+                  <a:srgbClr val="000000"/>
+                </a:solidFill>
+              </a:rPr>
+              <a:t>Per Cleve and Zeller [ICSE ’05]</a:t>
+            </a:r>
+          </a:p>
+          <a:p>
+            <a:r>
+              <a:rPr lang="en-US" dirty="0" smtClean="0">
+                <a:solidFill>
+                  <a:srgbClr val="000000"/>
+                </a:solidFill>
+              </a:rPr>
+              <a:t>Useful only if </a:t>
+            </a:r>
+            <a:r>
+              <a:rPr lang="en-US" i="1" dirty="0" smtClean="0">
+                <a:solidFill>
+                  <a:srgbClr val="000000"/>
+                </a:solidFill>
+              </a:rPr>
+              <a:t>effort &lt;</a:t>
+            </a:r>
+            <a:r>
+              <a:rPr lang="en-US" dirty="0" smtClean="0">
+                <a:solidFill>
+                  <a:srgbClr val="000000"/>
+                </a:solidFill>
+              </a:rPr>
+              <a:t> 5</a:t>
+            </a:r>
+            <a:r>
+              <a:rPr lang="en-US" i="1" dirty="0" smtClean="0">
+                <a:solidFill>
+                  <a:srgbClr val="000000"/>
+                </a:solidFill>
+              </a:rPr>
+              <a:t> </a:t>
+            </a:r>
+            <a:r>
+              <a:rPr lang="en-US" dirty="0" smtClean="0">
+                <a:solidFill>
+                  <a:srgbClr val="000000"/>
+                </a:solidFill>
+              </a:rPr>
+              <a:t>%</a:t>
+            </a:r>
+          </a:p>
+          <a:p>
+            <a:pPr marL="742950" lvl="2" indent="-342900">
+              <a:spcBef>
+                <a:spcPct val="70000"/>
+              </a:spcBef>
+            </a:pPr>
+            <a:endParaRPr lang="en-US" dirty="0" smtClean="0">
+              <a:latin typeface="+mj-lt"/>
+              <a:ea typeface="Cambria Math"/>
+            </a:endParaRPr>
+          </a:p>
+        </p:txBody>
+      </p:sp>
+      <p:sp>
+        <p:nvSpPr>
+          <p:cNvPr id="4" name="Slide Number Placeholder 3"/>
+          <p:cNvSpPr>
+            <a:spLocks noGrp="1"/>
+          </p:cNvSpPr>
+          <p:nvPr>
+            <p:ph type="sldNum" sz="quarter" idx="12"/>
+          </p:nvPr>
+        </p:nvSpPr>
+        <p:spPr/>
+        <p:txBody>
+          <a:bodyPr/>
+          <a:lstStyle/>
+          <a:p>
+            <a:fld id="{76AA3AEA-7752-4547-B37E-F079CFE3B3F4}" type="slidenum">
+              <a:rPr lang="en-US" smtClean="0"/>
+              <a:pPr/>
+              <a:t>16</a:t>
+            </a:fld>
+            <a:endParaRPr lang="en-US" dirty="0"/>
+          </a:p>
+        </p:txBody>
+      </p:sp>
+    </p:spTree>
+  </p:cSld>
+  <p:clrMapOvr>
+    <a:masterClrMapping/>
+  </p:clrMapOvr>
+  <p:transition/>
+  <p:timing>
+    <p:tnLst>
+      <p:par>
+        <p:cTn id="1" dur="indefinite" restart="never" nodeType="tmRoot"/>
+      </p:par>
+    </p:tnLst>
+  </p:timing>
+</p:sld>
+</file>
+
+<file path=ppt/slides/slide17.xml><?xml version="1.0" encoding="utf-8"?>
+<p:sld xmlns:a="http://schemas.openxmlformats.org/drawingml/2006/main" xmlns:r="http://schemas.openxmlformats.org/officeDocument/2006/relationships" xmlns:p="http://schemas.openxmlformats.org/presentationml/2006/main">
+  <p:cSld>
+    <p:spTree>
+      <p:nvGrpSpPr>
+        <p:cNvPr id="1" name=""/>
+        <p:cNvGrpSpPr/>
+        <p:nvPr/>
+      </p:nvGrpSpPr>
+      <p:grpSpPr>
+        <a:xfrm>
+          <a:off x="0" y="0"/>
+          <a:ext cx="0" cy="0"/>
+          <a:chOff x="0" y="0"/>
+          <a:chExt cx="0" cy="0"/>
+        </a:xfrm>
+      </p:grpSpPr>
+      <p:sp>
+        <p:nvSpPr>
+          <p:cNvPr id="5" name="Title 4"/>
+          <p:cNvSpPr>
+            <a:spLocks noGrp="1"/>
+          </p:cNvSpPr>
+          <p:nvPr>
+            <p:ph type="ctrTitle"/>
+          </p:nvPr>
+        </p:nvSpPr>
+        <p:spPr/>
+        <p:txBody>
+          <a:bodyPr/>
+          <a:lstStyle/>
+          <a:p>
+            <a:r>
+              <a:rPr lang="en-US" sz="6000" dirty="0" smtClean="0"/>
+              <a:t>Evaluation</a:t>
+            </a:r>
+            <a:endParaRPr lang="en-US" sz="6000" dirty="0"/>
+          </a:p>
+        </p:txBody>
+      </p:sp>
+      <p:sp>
+        <p:nvSpPr>
+          <p:cNvPr id="6" name="Subtitle 5"/>
+          <p:cNvSpPr>
+            <a:spLocks noGrp="1"/>
+          </p:cNvSpPr>
+          <p:nvPr>
+            <p:ph type="subTitle" idx="1"/>
+          </p:nvPr>
+        </p:nvSpPr>
+        <p:spPr/>
+        <p:txBody>
+          <a:bodyPr/>
+          <a:lstStyle/>
+          <a:p>
+            <a:endParaRPr lang="en-US"/>
+          </a:p>
+        </p:txBody>
+      </p:sp>
+      <p:sp>
+        <p:nvSpPr>
+          <p:cNvPr id="4" name="Slide Number Placeholder 3"/>
+          <p:cNvSpPr>
+            <a:spLocks noGrp="1"/>
+          </p:cNvSpPr>
+          <p:nvPr>
+            <p:ph type="sldNum" sz="quarter" idx="4"/>
+          </p:nvPr>
+        </p:nvSpPr>
+        <p:spPr/>
+        <p:txBody>
+          <a:bodyPr/>
+          <a:lstStyle/>
+          <a:p>
+            <a:fld id="{76AA3AEA-7752-4547-B37E-F079CFE3B3F4}" type="slidenum">
+              <a:rPr lang="en-US" smtClean="0"/>
+              <a:pPr/>
+              <a:t>17</a:t>
+            </a:fld>
+            <a:endParaRPr lang="en-US" dirty="0"/>
+          </a:p>
+        </p:txBody>
+      </p:sp>
+    </p:spTree>
+  </p:cSld>
+  <p:clrMapOvr>
+    <a:masterClrMapping/>
+  </p:clrMapOvr>
+  <p:transition/>
+  <p:timing>
+    <p:tnLst>
+      <p:par>
+        <p:cTn id="1" dur="indefinite" restart="never" nodeType="tmRoot"/>
+      </p:par>
+    </p:tnLst>
+  </p:timing>
+</p:sld>
+</file>
+
+<file path=ppt/slides/slide18.xml><?xml version="1.0" encoding="utf-8"?>
+<p:sld xmlns:a="http://schemas.openxmlformats.org/drawingml/2006/main" xmlns:r="http://schemas.openxmlformats.org/officeDocument/2006/relationships" xmlns:p="http://schemas.openxmlformats.org/presentationml/2006/main">
+  <p:cSld>
+    <p:spTree>
+      <p:nvGrpSpPr>
+        <p:cNvPr id="1" name=""/>
+        <p:cNvGrpSpPr/>
+        <p:nvPr/>
+      </p:nvGrpSpPr>
+      <p:grpSpPr>
+        <a:xfrm>
+          <a:off x="0" y="0"/>
+          <a:ext cx="0" cy="0"/>
+          <a:chOff x="0" y="0"/>
+          <a:chExt cx="0" cy="0"/>
+        </a:xfrm>
+      </p:grpSpPr>
+      <p:sp>
+        <p:nvSpPr>
+          <p:cNvPr id="2" name="Title 1"/>
+          <p:cNvSpPr>
+            <a:spLocks noGrp="1"/>
+          </p:cNvSpPr>
+          <p:nvPr>
+            <p:ph type="title"/>
+          </p:nvPr>
+        </p:nvSpPr>
+        <p:spPr/>
+        <p:txBody>
+          <a:bodyPr/>
+          <a:lstStyle/>
+          <a:p>
+            <a:r>
+              <a:rPr lang="en-US" dirty="0" smtClean="0"/>
+              <a:t>Usefulness – What kind of predicate has the top score?</a:t>
+            </a:r>
+            <a:endParaRPr lang="en-US" dirty="0"/>
+          </a:p>
+        </p:txBody>
+      </p:sp>
+      <p:sp>
+        <p:nvSpPr>
+          <p:cNvPr id="4" name="Slide Number Placeholder 3"/>
+          <p:cNvSpPr>
+            <a:spLocks noGrp="1"/>
+          </p:cNvSpPr>
+          <p:nvPr>
+            <p:ph type="sldNum" sz="quarter" idx="12"/>
+          </p:nvPr>
+        </p:nvSpPr>
+        <p:spPr/>
+        <p:txBody>
+          <a:bodyPr/>
+          <a:lstStyle/>
+          <a:p>
+            <a:fld id="{76AA3AEA-7752-4547-B37E-F079CFE3B3F4}" type="slidenum">
+              <a:rPr lang="en-US" smtClean="0"/>
+              <a:pPr/>
+              <a:t>18</a:t>
+            </a:fld>
+            <a:endParaRPr lang="en-US" dirty="0"/>
+          </a:p>
+        </p:txBody>
+      </p:sp>
+      <p:pic>
+        <p:nvPicPr>
+          <p:cNvPr id="43010" name="Picture 2"/>
+          <p:cNvPicPr>
+            <a:picLocks noChangeAspect="1" noChangeArrowheads="1"/>
+          </p:cNvPicPr>
+          <p:nvPr/>
+        </p:nvPicPr>
+        <p:blipFill>
+          <a:blip r:embed="rId3"/>
+          <a:srcRect/>
+          <a:stretch>
+            <a:fillRect/>
+          </a:stretch>
+        </p:blipFill>
+        <p:spPr bwMode="auto">
+          <a:xfrm>
+            <a:off x="1600200" y="1828800"/>
+            <a:ext cx="6542555" cy="4330700"/>
+          </a:xfrm>
+          <a:prstGeom prst="rect">
+            <a:avLst/>
+          </a:prstGeom>
+          <a:noFill/>
+          <a:ln w="9525">
+            <a:noFill/>
+            <a:miter lim="800000"/>
+            <a:headEnd/>
+            <a:tailEnd/>
+          </a:ln>
+          <a:effectLst/>
+        </p:spPr>
+      </p:pic>
+    </p:spTree>
+  </p:cSld>
+  <p:clrMapOvr>
+    <a:masterClrMapping/>
+  </p:clrMapOvr>
+  <p:transition/>
+  <p:timing>
+    <p:tnLst>
+      <p:par>
+        <p:cTn id="1" dur="indefinite" restart="never" nodeType="tmRoot"/>
+      </p:par>
+    </p:tnLst>
+  </p:timing>
+</p:sld>
+</file>
+
+<file path=ppt/slides/slide19.xml><?xml version="1.0" encoding="utf-8"?>
+<p:sld xmlns:a="http://schemas.openxmlformats.org/drawingml/2006/main" xmlns:r="http://schemas.openxmlformats.org/officeDocument/2006/relationships" xmlns:p="http://schemas.openxmlformats.org/presentationml/2006/main">
+  <p:cSld>
+    <p:spTree>
+      <p:nvGrpSpPr>
+        <p:cNvPr id="1" name=""/>
+        <p:cNvGrpSpPr/>
+        <p:nvPr/>
+      </p:nvGrpSpPr>
+      <p:grpSpPr>
+        <a:xfrm>
+          <a:off x="0" y="0"/>
+          <a:ext cx="0" cy="0"/>
+          <a:chOff x="0" y="0"/>
+          <a:chExt cx="0" cy="0"/>
+        </a:xfrm>
+      </p:grpSpPr>
+      <p:sp>
+        <p:nvSpPr>
+          <p:cNvPr id="2" name="Title 1"/>
+          <p:cNvSpPr>
+            <a:spLocks noGrp="1"/>
+          </p:cNvSpPr>
+          <p:nvPr>
+            <p:ph type="title"/>
+          </p:nvPr>
+        </p:nvSpPr>
+        <p:spPr/>
+        <p:txBody>
+          <a:bodyPr/>
+          <a:lstStyle/>
+          <a:p>
+            <a:r>
+              <a:rPr lang="en-US" dirty="0" smtClean="0"/>
+              <a:t>Practicality</a:t>
+            </a:r>
+            <a:endParaRPr lang="en-US" dirty="0"/>
+          </a:p>
+        </p:txBody>
+      </p:sp>
+      <p:sp>
+        <p:nvSpPr>
+          <p:cNvPr id="4" name="Slide Number Placeholder 3"/>
+          <p:cNvSpPr>
+            <a:spLocks noGrp="1"/>
+          </p:cNvSpPr>
+          <p:nvPr>
+            <p:ph type="sldNum" sz="quarter" idx="12"/>
+          </p:nvPr>
+        </p:nvSpPr>
+        <p:spPr/>
+        <p:txBody>
+          <a:bodyPr/>
+          <a:lstStyle/>
+          <a:p>
+            <a:fld id="{76AA3AEA-7752-4547-B37E-F079CFE3B3F4}" type="slidenum">
+              <a:rPr lang="en-US" smtClean="0"/>
+              <a:pPr/>
+              <a:t>19</a:t>
+            </a:fld>
+            <a:endParaRPr lang="en-US" dirty="0"/>
+          </a:p>
+        </p:txBody>
+      </p:sp>
+      <p:sp>
+        <p:nvSpPr>
+          <p:cNvPr id="23" name="Content Placeholder 22"/>
+          <p:cNvSpPr>
+            <a:spLocks noGrp="1"/>
+          </p:cNvSpPr>
+          <p:nvPr>
+            <p:ph idx="1"/>
+          </p:nvPr>
+        </p:nvSpPr>
+        <p:spPr>
+          <a:xfrm>
+            <a:off x="685800" y="2514600"/>
+            <a:ext cx="7772400" cy="4343400"/>
+          </a:xfrm>
+        </p:spPr>
+        <p:txBody>
+          <a:bodyPr>
+            <a:normAutofit fontScale="70000" lnSpcReduction="20000"/>
+          </a:bodyPr>
+          <a:lstStyle/>
+          <a:p>
+            <a:endParaRPr lang="en-US" dirty="0" smtClean="0"/>
+          </a:p>
+          <a:p>
+            <a:endParaRPr lang="en-US" dirty="0" smtClean="0"/>
+          </a:p>
+          <a:p>
+            <a:endParaRPr lang="en-US" dirty="0" smtClean="0"/>
+          </a:p>
+          <a:p>
+            <a:endParaRPr lang="en-US" dirty="0" smtClean="0"/>
+          </a:p>
+          <a:p>
+            <a:endParaRPr lang="en-US" dirty="0" smtClean="0"/>
+          </a:p>
+          <a:p>
+            <a:endParaRPr lang="en-US" dirty="0" smtClean="0"/>
+          </a:p>
+          <a:p>
+            <a:pPr algn="ctr">
+              <a:buNone/>
+            </a:pPr>
+            <a:r>
+              <a:rPr lang="en-US" dirty="0" smtClean="0"/>
+              <a:t>Analysis time reduces from ~20 minutes to ~6 minutes</a:t>
+            </a:r>
+          </a:p>
+          <a:p>
+            <a:pPr algn="ctr">
+              <a:buNone/>
+            </a:pPr>
+            <a:r>
+              <a:rPr lang="en-US" dirty="0" smtClean="0"/>
+              <a:t>(Just 1 minute for aggressive pruning)</a:t>
+            </a:r>
+          </a:p>
+        </p:txBody>
+      </p:sp>
+      <p:pic>
+        <p:nvPicPr>
+          <p:cNvPr id="46083" name="Picture 3"/>
+          <p:cNvPicPr>
+            <a:picLocks noChangeAspect="1" noChangeArrowheads="1"/>
+          </p:cNvPicPr>
+          <p:nvPr/>
+        </p:nvPicPr>
+        <p:blipFill>
+          <a:blip r:embed="rId3"/>
+          <a:srcRect/>
+          <a:stretch>
+            <a:fillRect/>
+          </a:stretch>
+        </p:blipFill>
+        <p:spPr bwMode="auto">
+          <a:xfrm>
+            <a:off x="1600200" y="1676400"/>
+            <a:ext cx="6324600" cy="3807041"/>
+          </a:xfrm>
+          <a:prstGeom prst="rect">
+            <a:avLst/>
+          </a:prstGeom>
+          <a:noFill/>
+          <a:ln w="9525">
+            <a:noFill/>
+            <a:miter lim="800000"/>
+            <a:headEnd/>
+            <a:tailEnd/>
+          </a:ln>
+          <a:effectLst/>
+        </p:spPr>
+      </p:pic>
+    </p:spTree>
+  </p:cSld>
+  <p:clrMapOvr>
+    <a:masterClrMapping/>
+  </p:clrMapOvr>
+  <p:transition/>
+  <p:timing>
+    <p:tnLst>
+      <p:par>
+        <p:cTn id="1" dur="indefinite" restart="never" nodeType="tmRoot"/>
+      </p:par>
+    </p:tnLst>
+  </p:timing>
+</p:sld>
+</file>
+
+<file path=ppt/slides/slide2.xml><?xml version="1.0" encoding="utf-8"?>
+<p:sld xmlns:a="http://schemas.openxmlformats.org/drawingml/2006/main" xmlns:r="http://schemas.openxmlformats.org/officeDocument/2006/relationships" xmlns:p="http://schemas.openxmlformats.org/presentationml/2006/main">
+  <p:cSld>
+    <p:spTree>
+      <p:nvGrpSpPr>
+        <p:cNvPr id="1" name=""/>
+        <p:cNvGrpSpPr/>
+        <p:nvPr/>
+      </p:nvGrpSpPr>
+      <p:grpSpPr>
+        <a:xfrm>
+          <a:off x="0" y="0"/>
+          <a:ext cx="0" cy="0"/>
+          <a:chOff x="0" y="0"/>
+          <a:chExt cx="0" cy="0"/>
+        </a:xfrm>
+      </p:grpSpPr>
+      <p:sp>
+        <p:nvSpPr>
+          <p:cNvPr id="10242" name="Rectangle 2"/>
+          <p:cNvSpPr>
+            <a:spLocks noGrp="1" noChangeArrowheads="1"/>
+          </p:cNvSpPr>
+          <p:nvPr>
+            <p:ph type="title"/>
+          </p:nvPr>
+        </p:nvSpPr>
+        <p:spPr/>
+        <p:txBody>
+          <a:bodyPr/>
+          <a:lstStyle/>
+          <a:p>
+            <a:r>
+              <a:rPr lang="en-US" dirty="0"/>
+              <a:t>Cooperative Bug Isolation (CBI)</a:t>
+            </a:r>
+          </a:p>
+        </p:txBody>
+      </p:sp>
+      <p:sp>
+        <p:nvSpPr>
+          <p:cNvPr id="10243" name="Rectangle 3"/>
+          <p:cNvSpPr>
+            <a:spLocks noGrp="1" noChangeArrowheads="1"/>
+          </p:cNvSpPr>
+          <p:nvPr>
+            <p:ph type="body" idx="1"/>
+          </p:nvPr>
+        </p:nvSpPr>
+        <p:spPr/>
+        <p:txBody>
+          <a:bodyPr/>
+          <a:lstStyle/>
+          <a:p>
+            <a:r>
+              <a:rPr lang="en-US" dirty="0"/>
+              <a:t>Post deployment </a:t>
+            </a:r>
+            <a:r>
+              <a:rPr lang="en-US" dirty="0" smtClean="0"/>
+              <a:t>bug hunting</a:t>
+            </a:r>
+          </a:p>
+          <a:p>
+            <a:pPr lvl="1"/>
+            <a:r>
+              <a:rPr lang="en-US" dirty="0" smtClean="0"/>
+              <a:t>Mine feedback data for causes of failure</a:t>
+            </a:r>
+            <a:endParaRPr lang="en-US" dirty="0"/>
+          </a:p>
+          <a:p>
+            <a:r>
+              <a:rPr lang="en-US" dirty="0"/>
+              <a:t>Actual runs are a vast resource</a:t>
+            </a:r>
+          </a:p>
+          <a:p>
+            <a:pPr lvl="1"/>
+            <a:r>
+              <a:rPr lang="en-US" dirty="0" smtClean="0"/>
+              <a:t>Real-world executions are more interesting</a:t>
+            </a:r>
+          </a:p>
+          <a:p>
+            <a:pPr lvl="1"/>
+            <a:r>
+              <a:rPr lang="en-US" dirty="0" smtClean="0"/>
+              <a:t>Number </a:t>
+            </a:r>
+            <a:r>
+              <a:rPr lang="en-US" dirty="0"/>
+              <a:t>of real runs &gt;&gt; number of testing </a:t>
+            </a:r>
+            <a:r>
+              <a:rPr lang="en-US" dirty="0" smtClean="0"/>
+              <a:t>runs</a:t>
+            </a:r>
+            <a:endParaRPr lang="en-US" dirty="0"/>
+          </a:p>
+        </p:txBody>
+      </p:sp>
+      <p:sp>
+        <p:nvSpPr>
+          <p:cNvPr id="4" name="Slide Number Placeholder 3"/>
+          <p:cNvSpPr>
+            <a:spLocks noGrp="1"/>
+          </p:cNvSpPr>
+          <p:nvPr>
+            <p:ph type="sldNum" sz="quarter" idx="12"/>
+          </p:nvPr>
+        </p:nvSpPr>
+        <p:spPr/>
+        <p:txBody>
+          <a:bodyPr/>
+          <a:lstStyle/>
+          <a:p>
+            <a:fld id="{76AA3AEA-7752-4547-B37E-F079CFE3B3F4}" type="slidenum">
+              <a:rPr lang="en-US" smtClean="0"/>
+              <a:pPr/>
+              <a:t>2</a:t>
+            </a:fld>
+            <a:endParaRPr lang="en-US" dirty="0"/>
+          </a:p>
+        </p:txBody>
+      </p:sp>
+    </p:spTree>
+  </p:cSld>
+  <p:clrMapOvr>
+    <a:masterClrMapping/>
+  </p:clrMapOvr>
+  <p:transition/>
+  <p:timing>
+    <p:tnLst>
+      <p:par>
+        <p:cTn id="1" dur="indefinite" restart="never" nodeType="tmRoot"/>
+      </p:par>
+    </p:tnLst>
+  </p:timing>
+</p:sld>
+</file>
+
+<file path=ppt/slides/slide20.xml><?xml version="1.0" encoding="utf-8"?>
+<p:sld xmlns:a="http://schemas.openxmlformats.org/drawingml/2006/main" xmlns:r="http://schemas.openxmlformats.org/officeDocument/2006/relationships" xmlns:p="http://schemas.openxmlformats.org/presentationml/2006/main">
+  <p:cSld>
+    <p:spTree>
+      <p:nvGrpSpPr>
+        <p:cNvPr id="1" name=""/>
+        <p:cNvGrpSpPr/>
+        <p:nvPr/>
+      </p:nvGrpSpPr>
+      <p:grpSpPr>
+        <a:xfrm>
+          <a:off x="0" y="0"/>
+          <a:ext cx="0" cy="0"/>
+          <a:chOff x="0" y="0"/>
+          <a:chExt cx="0" cy="0"/>
+        </a:xfrm>
+      </p:grpSpPr>
+      <p:sp>
+        <p:nvSpPr>
+          <p:cNvPr id="2" name="Title 1"/>
+          <p:cNvSpPr>
+            <a:spLocks noGrp="1"/>
+          </p:cNvSpPr>
+          <p:nvPr>
+            <p:ph type="title"/>
+          </p:nvPr>
+        </p:nvSpPr>
+        <p:spPr/>
+        <p:txBody>
+          <a:bodyPr/>
+          <a:lstStyle/>
+          <a:p>
+            <a:r>
+              <a:rPr lang="en-US" dirty="0" smtClean="0"/>
+              <a:t>Related Work</a:t>
+            </a:r>
+            <a:endParaRPr lang="en-US" dirty="0"/>
+          </a:p>
+        </p:txBody>
+      </p:sp>
+      <p:sp>
+        <p:nvSpPr>
+          <p:cNvPr id="3" name="Content Placeholder 2"/>
+          <p:cNvSpPr>
+            <a:spLocks noGrp="1"/>
+          </p:cNvSpPr>
+          <p:nvPr>
+            <p:ph idx="1"/>
+          </p:nvPr>
+        </p:nvSpPr>
+        <p:spPr/>
+        <p:txBody>
+          <a:bodyPr/>
+          <a:lstStyle/>
+          <a:p>
+            <a:r>
+              <a:rPr lang="en-US" dirty="0" err="1" smtClean="0"/>
+              <a:t>Daikon</a:t>
+            </a:r>
+            <a:r>
+              <a:rPr lang="en-US" dirty="0" smtClean="0"/>
+              <a:t> [Ernst et al.] – Invariant Detector</a:t>
+            </a:r>
+          </a:p>
+          <a:p>
+            <a:pPr lvl="1"/>
+            <a:r>
+              <a:rPr lang="en-US" dirty="0" smtClean="0"/>
+              <a:t>Generates </a:t>
+            </a:r>
+            <a:r>
+              <a:rPr lang="en-US" i="1" dirty="0" smtClean="0"/>
+              <a:t>implications</a:t>
+            </a:r>
+          </a:p>
+          <a:p>
+            <a:r>
+              <a:rPr lang="en-US" dirty="0" smtClean="0"/>
+              <a:t>Bug Isolation Tools:</a:t>
+            </a:r>
+          </a:p>
+          <a:p>
+            <a:pPr lvl="1"/>
+            <a:r>
+              <a:rPr lang="en-US" dirty="0" smtClean="0"/>
+              <a:t>SOBER [Liu et al.]</a:t>
+            </a:r>
+          </a:p>
+          <a:p>
+            <a:pPr lvl="1"/>
+            <a:r>
+              <a:rPr lang="en-US" dirty="0" smtClean="0"/>
+              <a:t>Tarantula [Jones et al.]</a:t>
+            </a:r>
+            <a:endParaRPr lang="en-US" dirty="0"/>
+          </a:p>
+        </p:txBody>
+      </p:sp>
+      <p:sp>
+        <p:nvSpPr>
+          <p:cNvPr id="4" name="Slide Number Placeholder 3"/>
+          <p:cNvSpPr>
+            <a:spLocks noGrp="1"/>
+          </p:cNvSpPr>
+          <p:nvPr>
+            <p:ph type="sldNum" sz="quarter" idx="12"/>
+          </p:nvPr>
+        </p:nvSpPr>
+        <p:spPr/>
+        <p:txBody>
+          <a:bodyPr/>
+          <a:lstStyle/>
+          <a:p>
+            <a:fld id="{76AA3AEA-7752-4547-B37E-F079CFE3B3F4}" type="slidenum">
+              <a:rPr lang="en-US" smtClean="0"/>
+              <a:pPr/>
+              <a:t>20</a:t>
+            </a:fld>
+            <a:endParaRPr lang="en-US" dirty="0"/>
+          </a:p>
+        </p:txBody>
+      </p:sp>
+    </p:spTree>
+  </p:cSld>
+  <p:clrMapOvr>
+    <a:masterClrMapping/>
+  </p:clrMapOvr>
+  <p:transition/>
+  <p:timing>
+    <p:tnLst>
+      <p:par>
+        <p:cTn id="1" dur="indefinite" restart="never" nodeType="tmRoot"/>
+      </p:par>
+    </p:tnLst>
+  </p:timing>
+</p:sld>
+</file>
+
+<file path=ppt/slides/slide21.xml><?xml version="1.0" encoding="utf-8"?>
+<p:sld xmlns:a="http://schemas.openxmlformats.org/drawingml/2006/main" xmlns:r="http://schemas.openxmlformats.org/officeDocument/2006/relationships" xmlns:p="http://schemas.openxmlformats.org/presentationml/2006/main">
+  <p:cSld>
+    <p:spTree>
+      <p:nvGrpSpPr>
+        <p:cNvPr id="1" name=""/>
+        <p:cNvGrpSpPr/>
+        <p:nvPr/>
+      </p:nvGrpSpPr>
+      <p:grpSpPr>
+        <a:xfrm>
+          <a:off x="0" y="0"/>
+          <a:ext cx="0" cy="0"/>
+          <a:chOff x="0" y="0"/>
+          <a:chExt cx="0" cy="0"/>
+        </a:xfrm>
+      </p:grpSpPr>
+      <p:sp>
+        <p:nvSpPr>
+          <p:cNvPr id="2" name="Title 1"/>
+          <p:cNvSpPr>
+            <a:spLocks noGrp="1"/>
+          </p:cNvSpPr>
+          <p:nvPr>
+            <p:ph type="title"/>
+          </p:nvPr>
+        </p:nvSpPr>
+        <p:spPr/>
+        <p:txBody>
+          <a:bodyPr/>
+          <a:lstStyle/>
+          <a:p>
+            <a:r>
+              <a:rPr lang="en-US" dirty="0" smtClean="0"/>
+              <a:t>Conclusion &amp; Future Work</a:t>
+            </a:r>
+            <a:endParaRPr lang="en-US" dirty="0"/>
+          </a:p>
+        </p:txBody>
+      </p:sp>
+      <p:sp>
+        <p:nvSpPr>
+          <p:cNvPr id="3" name="Content Placeholder 2"/>
+          <p:cNvSpPr>
+            <a:spLocks noGrp="1"/>
+          </p:cNvSpPr>
+          <p:nvPr>
+            <p:ph idx="1"/>
+          </p:nvPr>
+        </p:nvSpPr>
+        <p:spPr/>
+        <p:txBody>
+          <a:bodyPr>
+            <a:normAutofit fontScale="92500" lnSpcReduction="20000"/>
+          </a:bodyPr>
+          <a:lstStyle/>
+          <a:p>
+            <a:r>
+              <a:rPr lang="en-US" dirty="0" smtClean="0"/>
+              <a:t>Enrich vocabulary of bug predictors</a:t>
+            </a:r>
+          </a:p>
+          <a:p>
+            <a:r>
+              <a:rPr lang="en-US" dirty="0" smtClean="0"/>
+              <a:t>Employ 3-valued logic, set estimation, static program structure</a:t>
+            </a:r>
+          </a:p>
+          <a:p>
+            <a:r>
+              <a:rPr lang="en-US" dirty="0" smtClean="0"/>
+              <a:t>Demonstrate usefulness and practicality</a:t>
+            </a:r>
+          </a:p>
+          <a:p>
+            <a:r>
+              <a:rPr lang="en-US" dirty="0" smtClean="0"/>
+              <a:t>Future work:</a:t>
+            </a:r>
+          </a:p>
+          <a:p>
+            <a:pPr lvl="1"/>
+            <a:r>
+              <a:rPr lang="en-US" dirty="0" smtClean="0"/>
+              <a:t>Implication of compound predicates in related analyses: Bi-clustering (</a:t>
+            </a:r>
+            <a:r>
+              <a:rPr lang="en-US" dirty="0" err="1" smtClean="0"/>
+              <a:t>Zheng</a:t>
+            </a:r>
+            <a:r>
+              <a:rPr lang="en-US" dirty="0" smtClean="0"/>
+              <a:t> et al.), BTRACE (</a:t>
+            </a:r>
+            <a:r>
+              <a:rPr lang="en-US" dirty="0" err="1" smtClean="0"/>
+              <a:t>Lal</a:t>
+            </a:r>
+            <a:r>
+              <a:rPr lang="en-US" dirty="0" smtClean="0"/>
+              <a:t> et al.)</a:t>
+            </a:r>
+            <a:endParaRPr lang="en-US" dirty="0"/>
+          </a:p>
+        </p:txBody>
+      </p:sp>
+      <p:sp>
+        <p:nvSpPr>
+          <p:cNvPr id="4" name="Slide Number Placeholder 3"/>
+          <p:cNvSpPr>
+            <a:spLocks noGrp="1"/>
+          </p:cNvSpPr>
+          <p:nvPr>
+            <p:ph type="sldNum" sz="quarter" idx="12"/>
+          </p:nvPr>
+        </p:nvSpPr>
+        <p:spPr/>
+        <p:txBody>
+          <a:bodyPr/>
+          <a:lstStyle/>
+          <a:p>
+            <a:fld id="{76AA3AEA-7752-4547-B37E-F079CFE3B3F4}" type="slidenum">
+              <a:rPr lang="en-US" smtClean="0"/>
+              <a:pPr/>
+              <a:t>21</a:t>
+            </a:fld>
+            <a:endParaRPr lang="en-US" dirty="0"/>
+          </a:p>
+        </p:txBody>
+      </p:sp>
+    </p:spTree>
+  </p:cSld>
+  <p:clrMapOvr>
+    <a:masterClrMapping/>
+  </p:clrMapOvr>
+  <p:transition/>
+  <p:timing>
+    <p:tnLst>
+      <p:par>
+        <p:cTn id="1" dur="indefinite" restart="never" nodeType="tmRoot"/>
+      </p:par>
+    </p:tnLst>
+  </p:timing>
+</p:sld>
+</file>
+
+<file path=ppt/slides/slide22.xml><?xml version="1.0" encoding="utf-8"?>
+<p:sld xmlns:a="http://schemas.openxmlformats.org/drawingml/2006/main" xmlns:r="http://schemas.openxmlformats.org/officeDocument/2006/relationships" xmlns:p="http://schemas.openxmlformats.org/presentationml/2006/main">
+  <p:cSld>
+    <p:spTree>
+      <p:nvGrpSpPr>
+        <p:cNvPr id="1" name=""/>
+        <p:cNvGrpSpPr/>
+        <p:nvPr/>
+      </p:nvGrpSpPr>
+      <p:grpSpPr>
+        <a:xfrm>
+          <a:off x="0" y="0"/>
+          <a:ext cx="0" cy="0"/>
+          <a:chOff x="0" y="0"/>
+          <a:chExt cx="0" cy="0"/>
+        </a:xfrm>
+      </p:grpSpPr>
+      <p:sp>
+        <p:nvSpPr>
+          <p:cNvPr id="2" name="Title 1"/>
+          <p:cNvSpPr>
+            <a:spLocks noGrp="1"/>
+          </p:cNvSpPr>
+          <p:nvPr>
+            <p:ph type="ctrTitle"/>
+          </p:nvPr>
+        </p:nvSpPr>
+        <p:spPr/>
+        <p:txBody>
+          <a:bodyPr/>
+          <a:lstStyle/>
+          <a:p>
+            <a:r>
+              <a:rPr lang="en-US" sz="6000" dirty="0" smtClean="0"/>
+              <a:t>Thank You</a:t>
+            </a:r>
+            <a:endParaRPr lang="en-US" sz="6000" dirty="0"/>
+          </a:p>
+        </p:txBody>
+      </p:sp>
+      <p:sp>
+        <p:nvSpPr>
+          <p:cNvPr id="3" name="Subtitle 2"/>
+          <p:cNvSpPr>
+            <a:spLocks noGrp="1"/>
+          </p:cNvSpPr>
+          <p:nvPr>
+            <p:ph type="subTitle" idx="1"/>
+          </p:nvPr>
+        </p:nvSpPr>
+        <p:spPr/>
+        <p:txBody>
+          <a:bodyPr/>
+          <a:lstStyle/>
+          <a:p>
+            <a:endParaRPr lang="en-US" dirty="0"/>
+          </a:p>
+        </p:txBody>
+      </p:sp>
+      <p:sp>
+        <p:nvSpPr>
+          <p:cNvPr id="4" name="Slide Number Placeholder 3"/>
+          <p:cNvSpPr>
+            <a:spLocks noGrp="1"/>
+          </p:cNvSpPr>
+          <p:nvPr>
+            <p:ph type="sldNum" sz="quarter" idx="4"/>
+          </p:nvPr>
+        </p:nvSpPr>
+        <p:spPr/>
+        <p:txBody>
+          <a:bodyPr/>
+          <a:lstStyle/>
+          <a:p>
+            <a:fld id="{ADA0BB77-41C4-4894-B02A-8C6475C16FA3}" type="slidenum">
+              <a:rPr lang="en-US" smtClean="0"/>
+              <a:pPr/>
+              <a:t>22</a:t>
+            </a:fld>
+            <a:endParaRPr lang="en-US" dirty="0"/>
+          </a:p>
+        </p:txBody>
+      </p:sp>
+    </p:spTree>
+  </p:cSld>
+  <p:clrMapOvr>
+    <a:masterClrMapping/>
+  </p:clrMapOvr>
+  <p:transition/>
+  <p:timing>
+    <p:tnLst>
+      <p:par>
+        <p:cTn id="1" dur="indefinite" restart="never" nodeType="tmRoot"/>
+      </p:par>
+    </p:tnLst>
+  </p:timing>
+</p:sld>
+</file>
+
+<file path=ppt/slides/slide23.xml><?xml version="1.0" encoding="utf-8"?>
+<p:sld xmlns:a="http://schemas.openxmlformats.org/drawingml/2006/main" xmlns:r="http://schemas.openxmlformats.org/officeDocument/2006/relationships" xmlns:p="http://schemas.openxmlformats.org/presentationml/2006/main">
+  <p:cSld>
+    <p:spTree>
+      <p:nvGrpSpPr>
+        <p:cNvPr id="1" name=""/>
+        <p:cNvGrpSpPr/>
+        <p:nvPr/>
+      </p:nvGrpSpPr>
+      <p:grpSpPr>
+        <a:xfrm>
+          <a:off x="0" y="0"/>
+          <a:ext cx="0" cy="0"/>
+          <a:chOff x="0" y="0"/>
+          <a:chExt cx="0" cy="0"/>
+        </a:xfrm>
+      </p:grpSpPr>
+      <p:sp>
+        <p:nvSpPr>
+          <p:cNvPr id="2" name="Title 1"/>
+          <p:cNvSpPr>
+            <a:spLocks noGrp="1"/>
+          </p:cNvSpPr>
+          <p:nvPr>
+            <p:ph type="title"/>
+          </p:nvPr>
+        </p:nvSpPr>
+        <p:spPr/>
+        <p:txBody>
+          <a:bodyPr/>
+          <a:lstStyle/>
+          <a:p>
+            <a:r>
+              <a:rPr lang="en-US" dirty="0" smtClean="0"/>
+              <a:t>Effect Of Sampling</a:t>
+            </a:r>
+            <a:endParaRPr lang="en-US" dirty="0"/>
+          </a:p>
+        </p:txBody>
+      </p:sp>
+      <p:sp>
+        <p:nvSpPr>
+          <p:cNvPr id="4" name="Slide Number Placeholder 3"/>
+          <p:cNvSpPr>
+            <a:spLocks noGrp="1"/>
+          </p:cNvSpPr>
+          <p:nvPr>
+            <p:ph type="sldNum" sz="quarter" idx="12"/>
+          </p:nvPr>
+        </p:nvSpPr>
+        <p:spPr/>
+        <p:txBody>
+          <a:bodyPr/>
+          <a:lstStyle/>
+          <a:p>
+            <a:fld id="{76AA3AEA-7752-4547-B37E-F079CFE3B3F4}" type="slidenum">
+              <a:rPr lang="en-US" smtClean="0"/>
+              <a:pPr/>
+              <a:t>23</a:t>
+            </a:fld>
+            <a:endParaRPr lang="en-US" dirty="0"/>
+          </a:p>
+        </p:txBody>
+      </p:sp>
+      <p:pic>
+        <p:nvPicPr>
+          <p:cNvPr id="44035" name="Picture 3"/>
+          <p:cNvPicPr>
+            <a:picLocks noChangeAspect="1" noChangeArrowheads="1"/>
+          </p:cNvPicPr>
+          <p:nvPr/>
+        </p:nvPicPr>
+        <p:blipFill>
+          <a:blip r:embed="rId3"/>
+          <a:srcRect/>
+          <a:stretch>
+            <a:fillRect/>
+          </a:stretch>
+        </p:blipFill>
+        <p:spPr bwMode="auto">
+          <a:xfrm>
+            <a:off x="2209800" y="1981200"/>
+            <a:ext cx="5896506" cy="3856037"/>
+          </a:xfrm>
+          <a:prstGeom prst="rect">
+            <a:avLst/>
+          </a:prstGeom>
+          <a:noFill/>
+          <a:ln w="9525">
+            <a:noFill/>
+            <a:miter lim="800000"/>
+            <a:headEnd/>
+            <a:tailEnd/>
+          </a:ln>
+          <a:effectLst/>
+        </p:spPr>
+      </p:pic>
+    </p:spTree>
+  </p:cSld>
+  <p:clrMapOvr>
+    <a:masterClrMapping/>
+  </p:clrMapOvr>
+  <p:transition/>
+  <p:timing>
+    <p:tnLst>
+      <p:par>
+        <p:cTn id="1" dur="indefinite" restart="never" nodeType="tmRoot"/>
+      </p:par>
+    </p:tnLst>
+  </p:timing>
+</p:sld>
+</file>
+
+<file path=ppt/slides/slide24.xml><?xml version="1.0" encoding="utf-8"?>
+<p:sld xmlns:a="http://schemas.openxmlformats.org/drawingml/2006/main" xmlns:r="http://schemas.openxmlformats.org/officeDocument/2006/relationships" xmlns:p="http://schemas.openxmlformats.org/presentationml/2006/main">
+  <p:cSld>
+    <p:spTree>
+      <p:nvGrpSpPr>
+        <p:cNvPr id="1" name=""/>
+        <p:cNvGrpSpPr/>
+        <p:nvPr/>
+      </p:nvGrpSpPr>
+      <p:grpSpPr>
+        <a:xfrm>
+          <a:off x="0" y="0"/>
+          <a:ext cx="0" cy="0"/>
+          <a:chOff x="0" y="0"/>
+          <a:chExt cx="0" cy="0"/>
+        </a:xfrm>
+      </p:grpSpPr>
+      <p:sp>
+        <p:nvSpPr>
+          <p:cNvPr id="2" name="Title 1"/>
+          <p:cNvSpPr>
+            <a:spLocks noGrp="1"/>
+          </p:cNvSpPr>
+          <p:nvPr>
+            <p:ph type="title"/>
+          </p:nvPr>
+        </p:nvSpPr>
+        <p:spPr/>
+        <p:txBody>
+          <a:bodyPr/>
+          <a:lstStyle/>
+          <a:p>
+            <a:r>
+              <a:rPr lang="en-US" dirty="0" smtClean="0"/>
+              <a:t>Usefulness At Lower Sampling Rates</a:t>
+            </a:r>
+            <a:endParaRPr lang="en-US" dirty="0"/>
+          </a:p>
+        </p:txBody>
+      </p:sp>
+      <p:sp>
+        <p:nvSpPr>
+          <p:cNvPr id="4" name="Slide Number Placeholder 3"/>
+          <p:cNvSpPr>
+            <a:spLocks noGrp="1"/>
+          </p:cNvSpPr>
+          <p:nvPr>
+            <p:ph type="sldNum" sz="quarter" idx="12"/>
+          </p:nvPr>
+        </p:nvSpPr>
+        <p:spPr/>
+        <p:txBody>
+          <a:bodyPr/>
+          <a:lstStyle/>
+          <a:p>
+            <a:fld id="{76AA3AEA-7752-4547-B37E-F079CFE3B3F4}" type="slidenum">
+              <a:rPr lang="en-US" smtClean="0"/>
+              <a:pPr/>
+              <a:t>24</a:t>
+            </a:fld>
+            <a:endParaRPr lang="en-US" dirty="0"/>
+          </a:p>
+        </p:txBody>
+      </p:sp>
+      <p:pic>
+        <p:nvPicPr>
+          <p:cNvPr id="44034" name="Picture 2"/>
+          <p:cNvPicPr>
+            <a:picLocks noChangeAspect="1" noChangeArrowheads="1"/>
+          </p:cNvPicPr>
+          <p:nvPr/>
+        </p:nvPicPr>
+        <p:blipFill>
+          <a:blip r:embed="rId3"/>
+          <a:srcRect/>
+          <a:stretch>
+            <a:fillRect/>
+          </a:stretch>
+        </p:blipFill>
+        <p:spPr bwMode="auto">
+          <a:xfrm>
+            <a:off x="1600200" y="1828800"/>
+            <a:ext cx="6557009" cy="4334256"/>
+          </a:xfrm>
+          <a:prstGeom prst="rect">
+            <a:avLst/>
+          </a:prstGeom>
+          <a:noFill/>
+          <a:ln w="9525">
+            <a:noFill/>
+            <a:miter lim="800000"/>
+            <a:headEnd/>
+            <a:tailEnd/>
+          </a:ln>
+          <a:effectLst/>
+        </p:spPr>
+      </p:pic>
+    </p:spTree>
+  </p:cSld>
+  <p:clrMapOvr>
+    <a:masterClrMapping/>
+  </p:clrMapOvr>
+  <p:transition/>
+  <p:timing>
+    <p:tnLst>
+      <p:par>
+        <p:cTn id="1" dur="indefinite" restart="never" nodeType="tmRoot"/>
+      </p:par>
+    </p:tnLst>
+  </p:timing>
+</p:sld>
+</file>
+
+<file path=ppt/slides/slide25.xml><?xml version="1.0" encoding="utf-8"?>
+<p:sld xmlns:a="http://schemas.openxmlformats.org/drawingml/2006/main" xmlns:r="http://schemas.openxmlformats.org/officeDocument/2006/relationships" xmlns:p="http://schemas.openxmlformats.org/presentationml/2006/main">
+  <p:cSld>
+    <p:spTree>
+      <p:nvGrpSpPr>
+        <p:cNvPr id="1" name=""/>
+        <p:cNvGrpSpPr/>
+        <p:nvPr/>
+      </p:nvGrpSpPr>
+      <p:grpSpPr>
+        <a:xfrm>
+          <a:off x="0" y="0"/>
+          <a:ext cx="0" cy="0"/>
+          <a:chOff x="0" y="0"/>
+          <a:chExt cx="0" cy="0"/>
+        </a:xfrm>
+      </p:grpSpPr>
+      <p:sp>
+        <p:nvSpPr>
+          <p:cNvPr id="2" name="Title 1"/>
+          <p:cNvSpPr>
+            <a:spLocks noGrp="1"/>
+          </p:cNvSpPr>
+          <p:nvPr>
+            <p:ph type="title"/>
+          </p:nvPr>
+        </p:nvSpPr>
+        <p:spPr/>
+        <p:txBody>
+          <a:bodyPr/>
+          <a:lstStyle/>
+          <a:p>
+            <a:r>
+              <a:rPr lang="en-US" dirty="0" smtClean="0">
+                <a:latin typeface="Cambria Math"/>
+                <a:ea typeface="Cambria Math"/>
+              </a:rPr>
+              <a:t>↓</a:t>
+            </a:r>
+            <a:r>
+              <a:rPr lang="en-US" dirty="0" smtClean="0">
+                <a:solidFill>
+                  <a:schemeClr val="accent2"/>
+                </a:solidFill>
+              </a:rPr>
+              <a:t>F(</a:t>
+            </a:r>
+            <a:r>
+              <a:rPr lang="en-US" i="1" dirty="0" smtClean="0">
+                <a:solidFill>
+                  <a:schemeClr val="accent2"/>
+                </a:solidFill>
+              </a:rPr>
+              <a:t>C</a:t>
+            </a:r>
+            <a:r>
+              <a:rPr lang="en-US" dirty="0" smtClean="0">
+                <a:solidFill>
+                  <a:schemeClr val="accent2"/>
+                </a:solidFill>
+              </a:rPr>
+              <a:t> </a:t>
+            </a:r>
+            <a:r>
+              <a:rPr lang="en-US" i="1" dirty="0" err="1" smtClean="0">
+                <a:solidFill>
+                  <a:schemeClr val="accent2"/>
+                </a:solidFill>
+              </a:rPr>
+              <a:t>obs</a:t>
+            </a:r>
+            <a:r>
+              <a:rPr lang="en-US" dirty="0" smtClean="0">
+                <a:solidFill>
+                  <a:schemeClr val="accent2"/>
+                </a:solidFill>
+              </a:rPr>
+              <a:t>)</a:t>
+            </a:r>
+            <a:endParaRPr lang="en-US" dirty="0"/>
+          </a:p>
+        </p:txBody>
+      </p:sp>
+      <p:sp>
+        <p:nvSpPr>
+          <p:cNvPr id="4" name="Slide Number Placeholder 3"/>
+          <p:cNvSpPr>
+            <a:spLocks noGrp="1"/>
+          </p:cNvSpPr>
+          <p:nvPr>
+            <p:ph type="sldNum" sz="quarter" idx="12"/>
+          </p:nvPr>
+        </p:nvSpPr>
+        <p:spPr/>
+        <p:txBody>
+          <a:bodyPr/>
+          <a:lstStyle/>
+          <a:p>
+            <a:fld id="{76AA3AEA-7752-4547-B37E-F079CFE3B3F4}" type="slidenum">
+              <a:rPr lang="en-US" smtClean="0"/>
+              <a:pPr/>
+              <a:t>25</a:t>
             </a:fld>
             <a:endParaRPr lang="en-US" dirty="0"/>
           </a:p>
@@ -15798,7 +17562,7 @@
       </p:sp>
       <p:grpSp>
         <p:nvGrpSpPr>
-          <p:cNvPr id="6" name="Group 30"/>
+          <p:cNvPr id="3" name="Group 30"/>
           <p:cNvGrpSpPr/>
           <p:nvPr/>
         </p:nvGrpSpPr>
@@ -16232,7 +17996,7 @@
       </p:cxnSp>
       <p:grpSp>
         <p:nvGrpSpPr>
-          <p:cNvPr id="18" name="Group 32"/>
+          <p:cNvPr id="5" name="Group 32"/>
           <p:cNvGrpSpPr/>
           <p:nvPr/>
         </p:nvGrpSpPr>
@@ -17001,7 +18765,7 @@
       </p:sp>
       <p:grpSp>
         <p:nvGrpSpPr>
-          <p:cNvPr id="76" name="Group 75"/>
+          <p:cNvPr id="6" name="Group 75"/>
           <p:cNvGrpSpPr/>
           <p:nvPr/>
         </p:nvGrpSpPr>
@@ -17144,7 +18908,7 @@
                                           </p:stCondLst>
                                         </p:cTn>
                                         <p:tgtEl>
-                                          <p:spTgt spid="18"/>
+                                          <p:spTgt spid="5"/>
                                         </p:tgtEl>
                                         <p:attrNameLst>
                                           <p:attrName>style.visibility</p:attrName>
@@ -17484,7 +19248,7 @@
                                           </p:stCondLst>
                                         </p:cTn>
                                         <p:tgtEl>
-                                          <p:spTgt spid="6"/>
+                                          <p:spTgt spid="3"/>
                                         </p:tgtEl>
                                         <p:attrNameLst>
                                           <p:attrName>style.visibility</p:attrName>
@@ -17875,7 +19639,7 @@
                                           </p:stCondLst>
                                         </p:cTn>
                                         <p:tgtEl>
-                                          <p:spTgt spid="76"/>
+                                          <p:spTgt spid="6"/>
                                         </p:tgtEl>
                                         <p:attrNameLst>
                                           <p:attrName>style.visibility</p:attrName>
@@ -17922,1437 +19686,12 @@
       <p:bldP spid="21" grpId="0" animBg="1"/>
       <p:bldP spid="23" grpId="0"/>
       <p:bldP spid="38" grpId="0"/>
-      <p:bldP spid="39" grpId="0" uiExpand="1" build="allAtOnce"/>
+      <p:bldP spid="39" grpId="0" build="allAtOnce"/>
       <p:bldP spid="52" grpId="0"/>
       <p:bldP spid="70" grpId="0" animBg="1"/>
       <p:bldP spid="70" grpId="1" animBg="1"/>
       <p:bldP spid="72" grpId="0"/>
     </p:bldLst>
-  </p:timing>
-</p:sld>
-</file>
-
-<file path=ppt/slides/slide16.xml><?xml version="1.0" encoding="utf-8"?>
-<p:sld xmlns:a="http://schemas.openxmlformats.org/drawingml/2006/main" xmlns:r="http://schemas.openxmlformats.org/officeDocument/2006/relationships" xmlns:p="http://schemas.openxmlformats.org/presentationml/2006/main">
-  <p:cSld>
-    <p:spTree>
-      <p:nvGrpSpPr>
-        <p:cNvPr id="1" name=""/>
-        <p:cNvGrpSpPr/>
-        <p:nvPr/>
-      </p:nvGrpSpPr>
-      <p:grpSpPr>
-        <a:xfrm>
-          <a:off x="0" y="0"/>
-          <a:ext cx="0" cy="0"/>
-          <a:chOff x="0" y="0"/>
-          <a:chExt cx="0" cy="0"/>
-        </a:xfrm>
-      </p:grpSpPr>
-      <p:sp>
-        <p:nvSpPr>
-          <p:cNvPr id="2" name="Title 1"/>
-          <p:cNvSpPr>
-            <a:spLocks noGrp="1"/>
-          </p:cNvSpPr>
-          <p:nvPr>
-            <p:ph type="title"/>
-          </p:nvPr>
-        </p:nvSpPr>
-        <p:spPr/>
-        <p:txBody>
-          <a:bodyPr/>
-          <a:lstStyle/>
-          <a:p>
-            <a:r>
-              <a:rPr lang="en-US" dirty="0" smtClean="0"/>
-              <a:t>Usability</a:t>
-            </a:r>
-            <a:endParaRPr lang="en-US" dirty="0"/>
-          </a:p>
-        </p:txBody>
-      </p:sp>
-      <p:sp>
-        <p:nvSpPr>
-          <p:cNvPr id="3" name="Content Placeholder 2"/>
-          <p:cNvSpPr>
-            <a:spLocks noGrp="1"/>
-          </p:cNvSpPr>
-          <p:nvPr>
-            <p:ph idx="1"/>
-          </p:nvPr>
-        </p:nvSpPr>
-        <p:spPr/>
-        <p:txBody>
-          <a:bodyPr>
-            <a:normAutofit fontScale="92500" lnSpcReduction="10000"/>
-          </a:bodyPr>
-          <a:lstStyle/>
-          <a:p>
-            <a:r>
-              <a:rPr lang="en-US" dirty="0" smtClean="0"/>
-              <a:t>Numerous predicates trouble programmer</a:t>
-            </a:r>
-          </a:p>
-          <a:p>
-            <a:pPr lvl="1"/>
-            <a:r>
-              <a:rPr lang="en-US" dirty="0" smtClean="0"/>
-              <a:t>Has to infer predicate relations</a:t>
-            </a:r>
-          </a:p>
-          <a:p>
-            <a:pPr lvl="1"/>
-            <a:r>
-              <a:rPr lang="en-US" dirty="0" smtClean="0"/>
-              <a:t>Will prefer </a:t>
-            </a:r>
-            <a:r>
-              <a:rPr lang="en-US" dirty="0" smtClean="0">
-                <a:latin typeface="Cambria Math"/>
-                <a:ea typeface="Cambria Math"/>
-              </a:rPr>
-              <a:t>∧</a:t>
-            </a:r>
-            <a:r>
-              <a:rPr lang="en-US" dirty="0" smtClean="0"/>
-              <a:t> or </a:t>
-            </a:r>
-            <a:r>
-              <a:rPr lang="en-US" dirty="0" smtClean="0">
-                <a:latin typeface="Cambria Math"/>
-                <a:ea typeface="Cambria Math"/>
-              </a:rPr>
-              <a:t>∨ </a:t>
-            </a:r>
-            <a:r>
-              <a:rPr lang="en-US" dirty="0" smtClean="0"/>
-              <a:t>of </a:t>
-            </a:r>
-            <a:r>
-              <a:rPr lang="en-US" i="1" dirty="0" smtClean="0"/>
-              <a:t>related</a:t>
-            </a:r>
-            <a:r>
-              <a:rPr lang="en-US" dirty="0" smtClean="0"/>
-              <a:t> predicates</a:t>
-            </a:r>
-          </a:p>
-          <a:p>
-            <a:pPr marL="342900" lvl="1" indent="-342900">
-              <a:spcBef>
-                <a:spcPct val="70000"/>
-              </a:spcBef>
-              <a:buFontTx/>
-              <a:buChar char="•"/>
-            </a:pPr>
-            <a:r>
-              <a:rPr lang="en-US" i="1" dirty="0" smtClean="0"/>
-              <a:t>effort</a:t>
-            </a:r>
-            <a:r>
-              <a:rPr lang="en-US" dirty="0" smtClean="0"/>
-              <a:t>(p</a:t>
-            </a:r>
-            <a:r>
-              <a:rPr lang="en-US" baseline="-25000" dirty="0" smtClean="0"/>
-              <a:t>1</a:t>
-            </a:r>
-            <a:r>
-              <a:rPr lang="en-US" dirty="0" smtClean="0"/>
-              <a:t>, p</a:t>
-            </a:r>
-            <a:r>
-              <a:rPr lang="en-US" baseline="-25000" dirty="0" smtClean="0"/>
-              <a:t>2</a:t>
-            </a:r>
-            <a:r>
-              <a:rPr lang="en-US" dirty="0" smtClean="0"/>
-              <a:t>) = proximity of p</a:t>
-            </a:r>
-            <a:r>
-              <a:rPr lang="en-US" baseline="-25000" dirty="0" smtClean="0"/>
-              <a:t>1</a:t>
-            </a:r>
-            <a:r>
-              <a:rPr lang="en-US" dirty="0" smtClean="0"/>
-              <a:t>and p</a:t>
-            </a:r>
-            <a:r>
-              <a:rPr lang="en-US" baseline="-25000" dirty="0" smtClean="0"/>
-              <a:t>2</a:t>
-            </a:r>
-            <a:r>
-              <a:rPr lang="en-US" dirty="0" smtClean="0"/>
-              <a:t> in PDG</a:t>
-            </a:r>
-          </a:p>
-          <a:p>
-            <a:pPr lvl="1"/>
-            <a:r>
-              <a:rPr lang="en-US" dirty="0" smtClean="0">
-                <a:solidFill>
-                  <a:srgbClr val="000000"/>
-                </a:solidFill>
-              </a:rPr>
-              <a:t>Fraction of entire program</a:t>
-            </a:r>
-          </a:p>
-          <a:p>
-            <a:pPr lvl="1"/>
-            <a:r>
-              <a:rPr lang="en-US" dirty="0" smtClean="0"/>
-              <a:t>PDG = CDG </a:t>
-            </a:r>
-            <a:r>
-              <a:rPr lang="en-US" dirty="0" smtClean="0">
-                <a:latin typeface="Cambria Math"/>
-                <a:ea typeface="Cambria Math"/>
-              </a:rPr>
-              <a:t>∪ D</a:t>
-            </a:r>
-            <a:r>
-              <a:rPr lang="en-US" dirty="0" smtClean="0"/>
-              <a:t>DG</a:t>
-            </a:r>
-          </a:p>
-          <a:p>
-            <a:pPr lvl="1"/>
-            <a:r>
-              <a:rPr lang="en-US" dirty="0" smtClean="0">
-                <a:solidFill>
-                  <a:srgbClr val="000000"/>
-                </a:solidFill>
-              </a:rPr>
-              <a:t>Per Cleve and Zeller [ICSE ’05]</a:t>
-            </a:r>
-          </a:p>
-          <a:p>
-            <a:r>
-              <a:rPr lang="en-US" dirty="0" smtClean="0">
-                <a:solidFill>
-                  <a:srgbClr val="000000"/>
-                </a:solidFill>
-              </a:rPr>
-              <a:t>Useful only if </a:t>
-            </a:r>
-            <a:r>
-              <a:rPr lang="en-US" i="1" dirty="0" smtClean="0">
-                <a:solidFill>
-                  <a:srgbClr val="000000"/>
-                </a:solidFill>
-              </a:rPr>
-              <a:t>effort &lt;</a:t>
-            </a:r>
-            <a:r>
-              <a:rPr lang="en-US" dirty="0" smtClean="0">
-                <a:solidFill>
-                  <a:srgbClr val="000000"/>
-                </a:solidFill>
-              </a:rPr>
-              <a:t> 5</a:t>
-            </a:r>
-            <a:r>
-              <a:rPr lang="en-US" i="1" dirty="0" smtClean="0">
-                <a:solidFill>
-                  <a:srgbClr val="000000"/>
-                </a:solidFill>
-              </a:rPr>
-              <a:t> </a:t>
-            </a:r>
-            <a:r>
-              <a:rPr lang="en-US" dirty="0" smtClean="0">
-                <a:solidFill>
-                  <a:srgbClr val="000000"/>
-                </a:solidFill>
-              </a:rPr>
-              <a:t>%</a:t>
-            </a:r>
-          </a:p>
-          <a:p>
-            <a:pPr marL="742950" lvl="2" indent="-342900">
-              <a:spcBef>
-                <a:spcPct val="70000"/>
-              </a:spcBef>
-            </a:pPr>
-            <a:endParaRPr lang="en-US" dirty="0" smtClean="0">
-              <a:latin typeface="+mj-lt"/>
-              <a:ea typeface="Cambria Math"/>
-            </a:endParaRPr>
-          </a:p>
-        </p:txBody>
-      </p:sp>
-      <p:sp>
-        <p:nvSpPr>
-          <p:cNvPr id="4" name="Slide Number Placeholder 3"/>
-          <p:cNvSpPr>
-            <a:spLocks noGrp="1"/>
-          </p:cNvSpPr>
-          <p:nvPr>
-            <p:ph type="sldNum" sz="quarter" idx="12"/>
-          </p:nvPr>
-        </p:nvSpPr>
-        <p:spPr/>
-        <p:txBody>
-          <a:bodyPr/>
-          <a:lstStyle/>
-          <a:p>
-            <a:fld id="{76AA3AEA-7752-4547-B37E-F079CFE3B3F4}" type="slidenum">
-              <a:rPr lang="en-US" smtClean="0"/>
-              <a:pPr/>
-              <a:t>16</a:t>
-            </a:fld>
-            <a:endParaRPr lang="en-US" dirty="0"/>
-          </a:p>
-        </p:txBody>
-      </p:sp>
-    </p:spTree>
-  </p:cSld>
-  <p:clrMapOvr>
-    <a:masterClrMapping/>
-  </p:clrMapOvr>
-  <p:transition/>
-  <p:timing>
-    <p:tnLst>
-      <p:par>
-        <p:cTn id="1" dur="indefinite" restart="never" nodeType="tmRoot"/>
-      </p:par>
-    </p:tnLst>
-  </p:timing>
-</p:sld>
-</file>
-
-<file path=ppt/slides/slide17.xml><?xml version="1.0" encoding="utf-8"?>
-<p:sld xmlns:a="http://schemas.openxmlformats.org/drawingml/2006/main" xmlns:r="http://schemas.openxmlformats.org/officeDocument/2006/relationships" xmlns:p="http://schemas.openxmlformats.org/presentationml/2006/main">
-  <p:cSld>
-    <p:spTree>
-      <p:nvGrpSpPr>
-        <p:cNvPr id="1" name=""/>
-        <p:cNvGrpSpPr/>
-        <p:nvPr/>
-      </p:nvGrpSpPr>
-      <p:grpSpPr>
-        <a:xfrm>
-          <a:off x="0" y="0"/>
-          <a:ext cx="0" cy="0"/>
-          <a:chOff x="0" y="0"/>
-          <a:chExt cx="0" cy="0"/>
-        </a:xfrm>
-      </p:grpSpPr>
-      <p:sp>
-        <p:nvSpPr>
-          <p:cNvPr id="5" name="Title 4"/>
-          <p:cNvSpPr>
-            <a:spLocks noGrp="1"/>
-          </p:cNvSpPr>
-          <p:nvPr>
-            <p:ph type="ctrTitle"/>
-          </p:nvPr>
-        </p:nvSpPr>
-        <p:spPr/>
-        <p:txBody>
-          <a:bodyPr/>
-          <a:lstStyle/>
-          <a:p>
-            <a:r>
-              <a:rPr lang="en-US" sz="6000" dirty="0" smtClean="0"/>
-              <a:t>Evaluation</a:t>
-            </a:r>
-            <a:endParaRPr lang="en-US" sz="6000" dirty="0"/>
-          </a:p>
-        </p:txBody>
-      </p:sp>
-      <p:sp>
-        <p:nvSpPr>
-          <p:cNvPr id="6" name="Subtitle 5"/>
-          <p:cNvSpPr>
-            <a:spLocks noGrp="1"/>
-          </p:cNvSpPr>
-          <p:nvPr>
-            <p:ph type="subTitle" idx="1"/>
-          </p:nvPr>
-        </p:nvSpPr>
-        <p:spPr/>
-        <p:txBody>
-          <a:bodyPr/>
-          <a:lstStyle/>
-          <a:p>
-            <a:endParaRPr lang="en-US"/>
-          </a:p>
-        </p:txBody>
-      </p:sp>
-      <p:sp>
-        <p:nvSpPr>
-          <p:cNvPr id="4" name="Slide Number Placeholder 3"/>
-          <p:cNvSpPr>
-            <a:spLocks noGrp="1"/>
-          </p:cNvSpPr>
-          <p:nvPr>
-            <p:ph type="sldNum" sz="quarter" idx="4"/>
-          </p:nvPr>
-        </p:nvSpPr>
-        <p:spPr/>
-        <p:txBody>
-          <a:bodyPr/>
-          <a:lstStyle/>
-          <a:p>
-            <a:fld id="{76AA3AEA-7752-4547-B37E-F079CFE3B3F4}" type="slidenum">
-              <a:rPr lang="en-US" smtClean="0"/>
-              <a:pPr/>
-              <a:t>17</a:t>
-            </a:fld>
-            <a:endParaRPr lang="en-US" dirty="0"/>
-          </a:p>
-        </p:txBody>
-      </p:sp>
-    </p:spTree>
-  </p:cSld>
-  <p:clrMapOvr>
-    <a:masterClrMapping/>
-  </p:clrMapOvr>
-  <p:transition/>
-  <p:timing>
-    <p:tnLst>
-      <p:par>
-        <p:cTn id="1" dur="indefinite" restart="never" nodeType="tmRoot"/>
-      </p:par>
-    </p:tnLst>
-  </p:timing>
-</p:sld>
-</file>
-
-<file path=ppt/slides/slide18.xml><?xml version="1.0" encoding="utf-8"?>
-<p:sld xmlns:a="http://schemas.openxmlformats.org/drawingml/2006/main" xmlns:r="http://schemas.openxmlformats.org/officeDocument/2006/relationships" xmlns:p="http://schemas.openxmlformats.org/presentationml/2006/main">
-  <p:cSld>
-    <p:spTree>
-      <p:nvGrpSpPr>
-        <p:cNvPr id="1" name=""/>
-        <p:cNvGrpSpPr/>
-        <p:nvPr/>
-      </p:nvGrpSpPr>
-      <p:grpSpPr>
-        <a:xfrm>
-          <a:off x="0" y="0"/>
-          <a:ext cx="0" cy="0"/>
-          <a:chOff x="0" y="0"/>
-          <a:chExt cx="0" cy="0"/>
-        </a:xfrm>
-      </p:grpSpPr>
-      <p:sp>
-        <p:nvSpPr>
-          <p:cNvPr id="2" name="Title 1"/>
-          <p:cNvSpPr>
-            <a:spLocks noGrp="1"/>
-          </p:cNvSpPr>
-          <p:nvPr>
-            <p:ph type="title"/>
-          </p:nvPr>
-        </p:nvSpPr>
-        <p:spPr/>
-        <p:txBody>
-          <a:bodyPr/>
-          <a:lstStyle/>
-          <a:p>
-            <a:r>
-              <a:rPr lang="en-US" dirty="0" smtClean="0"/>
-              <a:t>Usefulness – What kind of predicate has the top score?</a:t>
-            </a:r>
-            <a:endParaRPr lang="en-US" dirty="0"/>
-          </a:p>
-        </p:txBody>
-      </p:sp>
-      <p:sp>
-        <p:nvSpPr>
-          <p:cNvPr id="4" name="Slide Number Placeholder 3"/>
-          <p:cNvSpPr>
-            <a:spLocks noGrp="1"/>
-          </p:cNvSpPr>
-          <p:nvPr>
-            <p:ph type="sldNum" sz="quarter" idx="12"/>
-          </p:nvPr>
-        </p:nvSpPr>
-        <p:spPr/>
-        <p:txBody>
-          <a:bodyPr/>
-          <a:lstStyle/>
-          <a:p>
-            <a:fld id="{76AA3AEA-7752-4547-B37E-F079CFE3B3F4}" type="slidenum">
-              <a:rPr lang="en-US" smtClean="0"/>
-              <a:pPr/>
-              <a:t>18</a:t>
-            </a:fld>
-            <a:endParaRPr lang="en-US" dirty="0"/>
-          </a:p>
-        </p:txBody>
-      </p:sp>
-      <p:pic>
-        <p:nvPicPr>
-          <p:cNvPr id="43010" name="Picture 2"/>
-          <p:cNvPicPr>
-            <a:picLocks noChangeAspect="1" noChangeArrowheads="1"/>
-          </p:cNvPicPr>
-          <p:nvPr/>
-        </p:nvPicPr>
-        <p:blipFill>
-          <a:blip r:embed="rId3"/>
-          <a:srcRect/>
-          <a:stretch>
-            <a:fillRect/>
-          </a:stretch>
-        </p:blipFill>
-        <p:spPr bwMode="auto">
-          <a:xfrm>
-            <a:off x="1600200" y="1828800"/>
-            <a:ext cx="6542555" cy="4330700"/>
-          </a:xfrm>
-          <a:prstGeom prst="rect">
-            <a:avLst/>
-          </a:prstGeom>
-          <a:noFill/>
-          <a:ln w="9525">
-            <a:noFill/>
-            <a:miter lim="800000"/>
-            <a:headEnd/>
-            <a:tailEnd/>
-          </a:ln>
-          <a:effectLst/>
-        </p:spPr>
-      </p:pic>
-    </p:spTree>
-  </p:cSld>
-  <p:clrMapOvr>
-    <a:masterClrMapping/>
-  </p:clrMapOvr>
-  <p:transition/>
-  <p:timing>
-    <p:tnLst>
-      <p:par>
-        <p:cTn id="1" dur="indefinite" restart="never" nodeType="tmRoot"/>
-      </p:par>
-    </p:tnLst>
-  </p:timing>
-</p:sld>
-</file>
-
-<file path=ppt/slides/slide19.xml><?xml version="1.0" encoding="utf-8"?>
-<p:sld xmlns:a="http://schemas.openxmlformats.org/drawingml/2006/main" xmlns:r="http://schemas.openxmlformats.org/officeDocument/2006/relationships" xmlns:p="http://schemas.openxmlformats.org/presentationml/2006/main">
-  <p:cSld>
-    <p:spTree>
-      <p:nvGrpSpPr>
-        <p:cNvPr id="1" name=""/>
-        <p:cNvGrpSpPr/>
-        <p:nvPr/>
-      </p:nvGrpSpPr>
-      <p:grpSpPr>
-        <a:xfrm>
-          <a:off x="0" y="0"/>
-          <a:ext cx="0" cy="0"/>
-          <a:chOff x="0" y="0"/>
-          <a:chExt cx="0" cy="0"/>
-        </a:xfrm>
-      </p:grpSpPr>
-      <p:sp>
-        <p:nvSpPr>
-          <p:cNvPr id="2" name="Title 1"/>
-          <p:cNvSpPr>
-            <a:spLocks noGrp="1"/>
-          </p:cNvSpPr>
-          <p:nvPr>
-            <p:ph type="title"/>
-          </p:nvPr>
-        </p:nvSpPr>
-        <p:spPr/>
-        <p:txBody>
-          <a:bodyPr/>
-          <a:lstStyle/>
-          <a:p>
-            <a:r>
-              <a:rPr lang="en-US" dirty="0" smtClean="0"/>
-              <a:t>Practicality</a:t>
-            </a:r>
-            <a:endParaRPr lang="en-US" dirty="0"/>
-          </a:p>
-        </p:txBody>
-      </p:sp>
-      <p:sp>
-        <p:nvSpPr>
-          <p:cNvPr id="4" name="Slide Number Placeholder 3"/>
-          <p:cNvSpPr>
-            <a:spLocks noGrp="1"/>
-          </p:cNvSpPr>
-          <p:nvPr>
-            <p:ph type="sldNum" sz="quarter" idx="12"/>
-          </p:nvPr>
-        </p:nvSpPr>
-        <p:spPr/>
-        <p:txBody>
-          <a:bodyPr/>
-          <a:lstStyle/>
-          <a:p>
-            <a:fld id="{76AA3AEA-7752-4547-B37E-F079CFE3B3F4}" type="slidenum">
-              <a:rPr lang="en-US" smtClean="0"/>
-              <a:pPr/>
-              <a:t>19</a:t>
-            </a:fld>
-            <a:endParaRPr lang="en-US" dirty="0"/>
-          </a:p>
-        </p:txBody>
-      </p:sp>
-      <p:sp>
-        <p:nvSpPr>
-          <p:cNvPr id="23" name="Content Placeholder 22"/>
-          <p:cNvSpPr>
-            <a:spLocks noGrp="1"/>
-          </p:cNvSpPr>
-          <p:nvPr>
-            <p:ph idx="1"/>
-          </p:nvPr>
-        </p:nvSpPr>
-        <p:spPr>
-          <a:xfrm>
-            <a:off x="685800" y="2514600"/>
-            <a:ext cx="7772400" cy="4343400"/>
-          </a:xfrm>
-        </p:spPr>
-        <p:txBody>
-          <a:bodyPr>
-            <a:normAutofit fontScale="70000" lnSpcReduction="20000"/>
-          </a:bodyPr>
-          <a:lstStyle/>
-          <a:p>
-            <a:endParaRPr lang="en-US" dirty="0" smtClean="0"/>
-          </a:p>
-          <a:p>
-            <a:endParaRPr lang="en-US" dirty="0" smtClean="0"/>
-          </a:p>
-          <a:p>
-            <a:endParaRPr lang="en-US" dirty="0" smtClean="0"/>
-          </a:p>
-          <a:p>
-            <a:endParaRPr lang="en-US" dirty="0" smtClean="0"/>
-          </a:p>
-          <a:p>
-            <a:endParaRPr lang="en-US" dirty="0" smtClean="0"/>
-          </a:p>
-          <a:p>
-            <a:endParaRPr lang="en-US" dirty="0" smtClean="0"/>
-          </a:p>
-          <a:p>
-            <a:pPr algn="ctr">
-              <a:buNone/>
-            </a:pPr>
-            <a:r>
-              <a:rPr lang="en-US" dirty="0" smtClean="0"/>
-              <a:t>Analysis time reduces from ~20 minutes to ~6 minutes</a:t>
-            </a:r>
-          </a:p>
-          <a:p>
-            <a:pPr algn="ctr">
-              <a:buNone/>
-            </a:pPr>
-            <a:r>
-              <a:rPr lang="en-US" dirty="0" smtClean="0"/>
-              <a:t>(Just 1 minute for aggressive pruning)</a:t>
-            </a:r>
-          </a:p>
-        </p:txBody>
-      </p:sp>
-      <p:pic>
-        <p:nvPicPr>
-          <p:cNvPr id="46083" name="Picture 3"/>
-          <p:cNvPicPr>
-            <a:picLocks noChangeAspect="1" noChangeArrowheads="1"/>
-          </p:cNvPicPr>
-          <p:nvPr/>
-        </p:nvPicPr>
-        <p:blipFill>
-          <a:blip r:embed="rId3"/>
-          <a:srcRect/>
-          <a:stretch>
-            <a:fillRect/>
-          </a:stretch>
-        </p:blipFill>
-        <p:spPr bwMode="auto">
-          <a:xfrm>
-            <a:off x="1600200" y="1676400"/>
-            <a:ext cx="6324600" cy="3807041"/>
-          </a:xfrm>
-          <a:prstGeom prst="rect">
-            <a:avLst/>
-          </a:prstGeom>
-          <a:noFill/>
-          <a:ln w="9525">
-            <a:noFill/>
-            <a:miter lim="800000"/>
-            <a:headEnd/>
-            <a:tailEnd/>
-          </a:ln>
-          <a:effectLst/>
-        </p:spPr>
-      </p:pic>
-    </p:spTree>
-  </p:cSld>
-  <p:clrMapOvr>
-    <a:masterClrMapping/>
-  </p:clrMapOvr>
-  <p:transition/>
-  <p:timing>
-    <p:tnLst>
-      <p:par>
-        <p:cTn id="1" dur="indefinite" restart="never" nodeType="tmRoot"/>
-      </p:par>
-    </p:tnLst>
-  </p:timing>
-</p:sld>
-</file>
-
-<file path=ppt/slides/slide2.xml><?xml version="1.0" encoding="utf-8"?>
-<p:sld xmlns:a="http://schemas.openxmlformats.org/drawingml/2006/main" xmlns:r="http://schemas.openxmlformats.org/officeDocument/2006/relationships" xmlns:p="http://schemas.openxmlformats.org/presentationml/2006/main">
-  <p:cSld>
-    <p:spTree>
-      <p:nvGrpSpPr>
-        <p:cNvPr id="1" name=""/>
-        <p:cNvGrpSpPr/>
-        <p:nvPr/>
-      </p:nvGrpSpPr>
-      <p:grpSpPr>
-        <a:xfrm>
-          <a:off x="0" y="0"/>
-          <a:ext cx="0" cy="0"/>
-          <a:chOff x="0" y="0"/>
-          <a:chExt cx="0" cy="0"/>
-        </a:xfrm>
-      </p:grpSpPr>
-      <p:sp>
-        <p:nvSpPr>
-          <p:cNvPr id="10242" name="Rectangle 2"/>
-          <p:cNvSpPr>
-            <a:spLocks noGrp="1" noChangeArrowheads="1"/>
-          </p:cNvSpPr>
-          <p:nvPr>
-            <p:ph type="title"/>
-          </p:nvPr>
-        </p:nvSpPr>
-        <p:spPr/>
-        <p:txBody>
-          <a:bodyPr/>
-          <a:lstStyle/>
-          <a:p>
-            <a:r>
-              <a:rPr lang="en-US" dirty="0"/>
-              <a:t>Cooperative Bug Isolation (CBI)</a:t>
-            </a:r>
-          </a:p>
-        </p:txBody>
-      </p:sp>
-      <p:sp>
-        <p:nvSpPr>
-          <p:cNvPr id="10243" name="Rectangle 3"/>
-          <p:cNvSpPr>
-            <a:spLocks noGrp="1" noChangeArrowheads="1"/>
-          </p:cNvSpPr>
-          <p:nvPr>
-            <p:ph type="body" idx="1"/>
-          </p:nvPr>
-        </p:nvSpPr>
-        <p:spPr/>
-        <p:txBody>
-          <a:bodyPr/>
-          <a:lstStyle/>
-          <a:p>
-            <a:r>
-              <a:rPr lang="en-US" dirty="0"/>
-              <a:t>Post deployment </a:t>
-            </a:r>
-            <a:r>
-              <a:rPr lang="en-US" dirty="0" smtClean="0"/>
-              <a:t>bug hunting</a:t>
-            </a:r>
-          </a:p>
-          <a:p>
-            <a:pPr lvl="1"/>
-            <a:r>
-              <a:rPr lang="en-US" dirty="0" smtClean="0"/>
-              <a:t>Mine feedback data for causes of failure</a:t>
-            </a:r>
-            <a:endParaRPr lang="en-US" dirty="0"/>
-          </a:p>
-          <a:p>
-            <a:r>
-              <a:rPr lang="en-US" dirty="0"/>
-              <a:t>Actual runs are a vast resource</a:t>
-            </a:r>
-          </a:p>
-          <a:p>
-            <a:pPr lvl="1"/>
-            <a:r>
-              <a:rPr lang="en-US" dirty="0" smtClean="0"/>
-              <a:t>Real-world executions are more interesting</a:t>
-            </a:r>
-          </a:p>
-          <a:p>
-            <a:pPr lvl="1"/>
-            <a:r>
-              <a:rPr lang="en-US" dirty="0" smtClean="0"/>
-              <a:t>Number </a:t>
-            </a:r>
-            <a:r>
-              <a:rPr lang="en-US" dirty="0"/>
-              <a:t>of real runs &gt;&gt; number of testing </a:t>
-            </a:r>
-            <a:r>
-              <a:rPr lang="en-US" dirty="0" smtClean="0"/>
-              <a:t>runs</a:t>
-            </a:r>
-            <a:endParaRPr lang="en-US" dirty="0"/>
-          </a:p>
-        </p:txBody>
-      </p:sp>
-      <p:sp>
-        <p:nvSpPr>
-          <p:cNvPr id="4" name="Slide Number Placeholder 3"/>
-          <p:cNvSpPr>
-            <a:spLocks noGrp="1"/>
-          </p:cNvSpPr>
-          <p:nvPr>
-            <p:ph type="sldNum" sz="quarter" idx="12"/>
-          </p:nvPr>
-        </p:nvSpPr>
-        <p:spPr/>
-        <p:txBody>
-          <a:bodyPr/>
-          <a:lstStyle/>
-          <a:p>
-            <a:fld id="{76AA3AEA-7752-4547-B37E-F079CFE3B3F4}" type="slidenum">
-              <a:rPr lang="en-US" smtClean="0"/>
-              <a:pPr/>
-              <a:t>2</a:t>
-            </a:fld>
-            <a:endParaRPr lang="en-US" dirty="0"/>
-          </a:p>
-        </p:txBody>
-      </p:sp>
-    </p:spTree>
-  </p:cSld>
-  <p:clrMapOvr>
-    <a:masterClrMapping/>
-  </p:clrMapOvr>
-  <p:transition/>
-  <p:timing>
-    <p:tnLst>
-      <p:par>
-        <p:cTn id="1" dur="indefinite" restart="never" nodeType="tmRoot"/>
-      </p:par>
-    </p:tnLst>
-  </p:timing>
-</p:sld>
-</file>
-
-<file path=ppt/slides/slide20.xml><?xml version="1.0" encoding="utf-8"?>
-<p:sld xmlns:a="http://schemas.openxmlformats.org/drawingml/2006/main" xmlns:r="http://schemas.openxmlformats.org/officeDocument/2006/relationships" xmlns:p="http://schemas.openxmlformats.org/presentationml/2006/main">
-  <p:cSld>
-    <p:spTree>
-      <p:nvGrpSpPr>
-        <p:cNvPr id="1" name=""/>
-        <p:cNvGrpSpPr/>
-        <p:nvPr/>
-      </p:nvGrpSpPr>
-      <p:grpSpPr>
-        <a:xfrm>
-          <a:off x="0" y="0"/>
-          <a:ext cx="0" cy="0"/>
-          <a:chOff x="0" y="0"/>
-          <a:chExt cx="0" cy="0"/>
-        </a:xfrm>
-      </p:grpSpPr>
-      <p:sp>
-        <p:nvSpPr>
-          <p:cNvPr id="2" name="Title 1"/>
-          <p:cNvSpPr>
-            <a:spLocks noGrp="1"/>
-          </p:cNvSpPr>
-          <p:nvPr>
-            <p:ph type="title"/>
-          </p:nvPr>
-        </p:nvSpPr>
-        <p:spPr/>
-        <p:txBody>
-          <a:bodyPr/>
-          <a:lstStyle/>
-          <a:p>
-            <a:r>
-              <a:rPr lang="en-US" dirty="0" smtClean="0"/>
-              <a:t>Related Work</a:t>
-            </a:r>
-            <a:endParaRPr lang="en-US" dirty="0"/>
-          </a:p>
-        </p:txBody>
-      </p:sp>
-      <p:sp>
-        <p:nvSpPr>
-          <p:cNvPr id="3" name="Content Placeholder 2"/>
-          <p:cNvSpPr>
-            <a:spLocks noGrp="1"/>
-          </p:cNvSpPr>
-          <p:nvPr>
-            <p:ph idx="1"/>
-          </p:nvPr>
-        </p:nvSpPr>
-        <p:spPr/>
-        <p:txBody>
-          <a:bodyPr/>
-          <a:lstStyle/>
-          <a:p>
-            <a:r>
-              <a:rPr lang="en-US" dirty="0" err="1" smtClean="0"/>
-              <a:t>Daikon</a:t>
-            </a:r>
-            <a:r>
-              <a:rPr lang="en-US" dirty="0" smtClean="0"/>
-              <a:t> [Ernst et al.] – Invariant Detector</a:t>
-            </a:r>
-          </a:p>
-          <a:p>
-            <a:pPr lvl="1"/>
-            <a:r>
-              <a:rPr lang="en-US" dirty="0" smtClean="0"/>
-              <a:t>Generates </a:t>
-            </a:r>
-            <a:r>
-              <a:rPr lang="en-US" i="1" dirty="0" smtClean="0"/>
-              <a:t>implications</a:t>
-            </a:r>
-          </a:p>
-          <a:p>
-            <a:r>
-              <a:rPr lang="en-US" dirty="0" smtClean="0"/>
-              <a:t>Bug Isolation Tools:</a:t>
-            </a:r>
-          </a:p>
-          <a:p>
-            <a:pPr lvl="1"/>
-            <a:r>
-              <a:rPr lang="en-US" dirty="0" smtClean="0"/>
-              <a:t>SOBER [Liu et al.]</a:t>
-            </a:r>
-          </a:p>
-          <a:p>
-            <a:pPr lvl="1"/>
-            <a:r>
-              <a:rPr lang="en-US" dirty="0" smtClean="0"/>
-              <a:t>Tarantula [Jones et al.]</a:t>
-            </a:r>
-            <a:endParaRPr lang="en-US" dirty="0"/>
-          </a:p>
-        </p:txBody>
-      </p:sp>
-      <p:sp>
-        <p:nvSpPr>
-          <p:cNvPr id="4" name="Slide Number Placeholder 3"/>
-          <p:cNvSpPr>
-            <a:spLocks noGrp="1"/>
-          </p:cNvSpPr>
-          <p:nvPr>
-            <p:ph type="sldNum" sz="quarter" idx="12"/>
-          </p:nvPr>
-        </p:nvSpPr>
-        <p:spPr/>
-        <p:txBody>
-          <a:bodyPr/>
-          <a:lstStyle/>
-          <a:p>
-            <a:fld id="{76AA3AEA-7752-4547-B37E-F079CFE3B3F4}" type="slidenum">
-              <a:rPr lang="en-US" smtClean="0"/>
-              <a:pPr/>
-              <a:t>20</a:t>
-            </a:fld>
-            <a:endParaRPr lang="en-US" dirty="0"/>
-          </a:p>
-        </p:txBody>
-      </p:sp>
-    </p:spTree>
-  </p:cSld>
-  <p:clrMapOvr>
-    <a:masterClrMapping/>
-  </p:clrMapOvr>
-  <p:transition/>
-  <p:timing>
-    <p:tnLst>
-      <p:par>
-        <p:cTn id="1" dur="indefinite" restart="never" nodeType="tmRoot"/>
-      </p:par>
-    </p:tnLst>
-  </p:timing>
-</p:sld>
-</file>
-
-<file path=ppt/slides/slide21.xml><?xml version="1.0" encoding="utf-8"?>
-<p:sld xmlns:a="http://schemas.openxmlformats.org/drawingml/2006/main" xmlns:r="http://schemas.openxmlformats.org/officeDocument/2006/relationships" xmlns:p="http://schemas.openxmlformats.org/presentationml/2006/main">
-  <p:cSld>
-    <p:spTree>
-      <p:nvGrpSpPr>
-        <p:cNvPr id="1" name=""/>
-        <p:cNvGrpSpPr/>
-        <p:nvPr/>
-      </p:nvGrpSpPr>
-      <p:grpSpPr>
-        <a:xfrm>
-          <a:off x="0" y="0"/>
-          <a:ext cx="0" cy="0"/>
-          <a:chOff x="0" y="0"/>
-          <a:chExt cx="0" cy="0"/>
-        </a:xfrm>
-      </p:grpSpPr>
-      <p:sp>
-        <p:nvSpPr>
-          <p:cNvPr id="2" name="Title 1"/>
-          <p:cNvSpPr>
-            <a:spLocks noGrp="1"/>
-          </p:cNvSpPr>
-          <p:nvPr>
-            <p:ph type="title"/>
-          </p:nvPr>
-        </p:nvSpPr>
-        <p:spPr/>
-        <p:txBody>
-          <a:bodyPr/>
-          <a:lstStyle/>
-          <a:p>
-            <a:r>
-              <a:rPr lang="en-US" dirty="0" smtClean="0"/>
-              <a:t>Conclusion &amp; Future Work</a:t>
-            </a:r>
-            <a:endParaRPr lang="en-US" dirty="0"/>
-          </a:p>
-        </p:txBody>
-      </p:sp>
-      <p:sp>
-        <p:nvSpPr>
-          <p:cNvPr id="3" name="Content Placeholder 2"/>
-          <p:cNvSpPr>
-            <a:spLocks noGrp="1"/>
-          </p:cNvSpPr>
-          <p:nvPr>
-            <p:ph idx="1"/>
-          </p:nvPr>
-        </p:nvSpPr>
-        <p:spPr/>
-        <p:txBody>
-          <a:bodyPr>
-            <a:normAutofit fontScale="92500" lnSpcReduction="20000"/>
-          </a:bodyPr>
-          <a:lstStyle/>
-          <a:p>
-            <a:r>
-              <a:rPr lang="en-US" dirty="0" smtClean="0"/>
-              <a:t>Enrich vocabulary of bug predictors</a:t>
-            </a:r>
-          </a:p>
-          <a:p>
-            <a:r>
-              <a:rPr lang="en-US" dirty="0" smtClean="0"/>
-              <a:t>Employ 3-valued logic, set estimation, static program structure</a:t>
-            </a:r>
-          </a:p>
-          <a:p>
-            <a:r>
-              <a:rPr lang="en-US" dirty="0" smtClean="0"/>
-              <a:t>Demonstrate usefulness and practicality</a:t>
-            </a:r>
-          </a:p>
-          <a:p>
-            <a:r>
-              <a:rPr lang="en-US" dirty="0" smtClean="0"/>
-              <a:t>Future work:</a:t>
-            </a:r>
-          </a:p>
-          <a:p>
-            <a:pPr lvl="1"/>
-            <a:r>
-              <a:rPr lang="en-US" dirty="0" smtClean="0"/>
-              <a:t>Implication of compound predicates in related analyses: Bi-clustering (</a:t>
-            </a:r>
-            <a:r>
-              <a:rPr lang="en-US" dirty="0" err="1" smtClean="0"/>
-              <a:t>Zheng</a:t>
-            </a:r>
-            <a:r>
-              <a:rPr lang="en-US" dirty="0" smtClean="0"/>
-              <a:t> et al.), BTRACE (</a:t>
-            </a:r>
-            <a:r>
-              <a:rPr lang="en-US" dirty="0" err="1" smtClean="0"/>
-              <a:t>Lal</a:t>
-            </a:r>
-            <a:r>
-              <a:rPr lang="en-US" dirty="0" smtClean="0"/>
-              <a:t> et al.)</a:t>
-            </a:r>
-            <a:endParaRPr lang="en-US" dirty="0"/>
-          </a:p>
-        </p:txBody>
-      </p:sp>
-      <p:sp>
-        <p:nvSpPr>
-          <p:cNvPr id="4" name="Slide Number Placeholder 3"/>
-          <p:cNvSpPr>
-            <a:spLocks noGrp="1"/>
-          </p:cNvSpPr>
-          <p:nvPr>
-            <p:ph type="sldNum" sz="quarter" idx="12"/>
-          </p:nvPr>
-        </p:nvSpPr>
-        <p:spPr/>
-        <p:txBody>
-          <a:bodyPr/>
-          <a:lstStyle/>
-          <a:p>
-            <a:fld id="{76AA3AEA-7752-4547-B37E-F079CFE3B3F4}" type="slidenum">
-              <a:rPr lang="en-US" smtClean="0"/>
-              <a:pPr/>
-              <a:t>21</a:t>
-            </a:fld>
-            <a:endParaRPr lang="en-US" dirty="0"/>
-          </a:p>
-        </p:txBody>
-      </p:sp>
-    </p:spTree>
-  </p:cSld>
-  <p:clrMapOvr>
-    <a:masterClrMapping/>
-  </p:clrMapOvr>
-  <p:transition/>
-  <p:timing>
-    <p:tnLst>
-      <p:par>
-        <p:cTn id="1" dur="indefinite" restart="never" nodeType="tmRoot"/>
-      </p:par>
-    </p:tnLst>
-  </p:timing>
-</p:sld>
-</file>
-
-<file path=ppt/slides/slide22.xml><?xml version="1.0" encoding="utf-8"?>
-<p:sld xmlns:a="http://schemas.openxmlformats.org/drawingml/2006/main" xmlns:r="http://schemas.openxmlformats.org/officeDocument/2006/relationships" xmlns:p="http://schemas.openxmlformats.org/presentationml/2006/main">
-  <p:cSld>
-    <p:spTree>
-      <p:nvGrpSpPr>
-        <p:cNvPr id="1" name=""/>
-        <p:cNvGrpSpPr/>
-        <p:nvPr/>
-      </p:nvGrpSpPr>
-      <p:grpSpPr>
-        <a:xfrm>
-          <a:off x="0" y="0"/>
-          <a:ext cx="0" cy="0"/>
-          <a:chOff x="0" y="0"/>
-          <a:chExt cx="0" cy="0"/>
-        </a:xfrm>
-      </p:grpSpPr>
-      <p:sp>
-        <p:nvSpPr>
-          <p:cNvPr id="2" name="Title 1"/>
-          <p:cNvSpPr>
-            <a:spLocks noGrp="1"/>
-          </p:cNvSpPr>
-          <p:nvPr>
-            <p:ph type="ctrTitle"/>
-          </p:nvPr>
-        </p:nvSpPr>
-        <p:spPr/>
-        <p:txBody>
-          <a:bodyPr/>
-          <a:lstStyle/>
-          <a:p>
-            <a:r>
-              <a:rPr lang="en-US" sz="6000" dirty="0" smtClean="0"/>
-              <a:t>Thank You</a:t>
-            </a:r>
-            <a:endParaRPr lang="en-US" sz="6000" dirty="0"/>
-          </a:p>
-        </p:txBody>
-      </p:sp>
-      <p:sp>
-        <p:nvSpPr>
-          <p:cNvPr id="3" name="Subtitle 2"/>
-          <p:cNvSpPr>
-            <a:spLocks noGrp="1"/>
-          </p:cNvSpPr>
-          <p:nvPr>
-            <p:ph type="subTitle" idx="1"/>
-          </p:nvPr>
-        </p:nvSpPr>
-        <p:spPr/>
-        <p:txBody>
-          <a:bodyPr/>
-          <a:lstStyle/>
-          <a:p>
-            <a:endParaRPr lang="en-US" dirty="0"/>
-          </a:p>
-        </p:txBody>
-      </p:sp>
-      <p:sp>
-        <p:nvSpPr>
-          <p:cNvPr id="4" name="Slide Number Placeholder 3"/>
-          <p:cNvSpPr>
-            <a:spLocks noGrp="1"/>
-          </p:cNvSpPr>
-          <p:nvPr>
-            <p:ph type="sldNum" sz="quarter" idx="4"/>
-          </p:nvPr>
-        </p:nvSpPr>
-        <p:spPr/>
-        <p:txBody>
-          <a:bodyPr/>
-          <a:lstStyle/>
-          <a:p>
-            <a:fld id="{ADA0BB77-41C4-4894-B02A-8C6475C16FA3}" type="slidenum">
-              <a:rPr lang="en-US" smtClean="0"/>
-              <a:pPr/>
-              <a:t>22</a:t>
-            </a:fld>
-            <a:endParaRPr lang="en-US" dirty="0"/>
-          </a:p>
-        </p:txBody>
-      </p:sp>
-    </p:spTree>
-  </p:cSld>
-  <p:clrMapOvr>
-    <a:masterClrMapping/>
-  </p:clrMapOvr>
-  <p:transition/>
-  <p:timing>
-    <p:tnLst>
-      <p:par>
-        <p:cTn id="1" dur="indefinite" restart="never" nodeType="tmRoot"/>
-      </p:par>
-    </p:tnLst>
-  </p:timing>
-</p:sld>
-</file>
-
-<file path=ppt/slides/slide23.xml><?xml version="1.0" encoding="utf-8"?>
-<p:sld xmlns:a="http://schemas.openxmlformats.org/drawingml/2006/main" xmlns:r="http://schemas.openxmlformats.org/officeDocument/2006/relationships" xmlns:p="http://schemas.openxmlformats.org/presentationml/2006/main">
-  <p:cSld>
-    <p:spTree>
-      <p:nvGrpSpPr>
-        <p:cNvPr id="1" name=""/>
-        <p:cNvGrpSpPr/>
-        <p:nvPr/>
-      </p:nvGrpSpPr>
-      <p:grpSpPr>
-        <a:xfrm>
-          <a:off x="0" y="0"/>
-          <a:ext cx="0" cy="0"/>
-          <a:chOff x="0" y="0"/>
-          <a:chExt cx="0" cy="0"/>
-        </a:xfrm>
-      </p:grpSpPr>
-      <p:sp>
-        <p:nvSpPr>
-          <p:cNvPr id="2" name="Title 1"/>
-          <p:cNvSpPr>
-            <a:spLocks noGrp="1"/>
-          </p:cNvSpPr>
-          <p:nvPr>
-            <p:ph type="title"/>
-          </p:nvPr>
-        </p:nvSpPr>
-        <p:spPr/>
-        <p:txBody>
-          <a:bodyPr/>
-          <a:lstStyle/>
-          <a:p>
-            <a:r>
-              <a:rPr lang="en-US" dirty="0" smtClean="0"/>
-              <a:t>Effect Of Sampling</a:t>
-            </a:r>
-            <a:endParaRPr lang="en-US" dirty="0"/>
-          </a:p>
-        </p:txBody>
-      </p:sp>
-      <p:sp>
-        <p:nvSpPr>
-          <p:cNvPr id="4" name="Slide Number Placeholder 3"/>
-          <p:cNvSpPr>
-            <a:spLocks noGrp="1"/>
-          </p:cNvSpPr>
-          <p:nvPr>
-            <p:ph type="sldNum" sz="quarter" idx="12"/>
-          </p:nvPr>
-        </p:nvSpPr>
-        <p:spPr/>
-        <p:txBody>
-          <a:bodyPr/>
-          <a:lstStyle/>
-          <a:p>
-            <a:fld id="{76AA3AEA-7752-4547-B37E-F079CFE3B3F4}" type="slidenum">
-              <a:rPr lang="en-US" smtClean="0"/>
-              <a:pPr/>
-              <a:t>23</a:t>
-            </a:fld>
-            <a:endParaRPr lang="en-US" dirty="0"/>
-          </a:p>
-        </p:txBody>
-      </p:sp>
-      <p:pic>
-        <p:nvPicPr>
-          <p:cNvPr id="44035" name="Picture 3"/>
-          <p:cNvPicPr>
-            <a:picLocks noChangeAspect="1" noChangeArrowheads="1"/>
-          </p:cNvPicPr>
-          <p:nvPr/>
-        </p:nvPicPr>
-        <p:blipFill>
-          <a:blip r:embed="rId3"/>
-          <a:srcRect/>
-          <a:stretch>
-            <a:fillRect/>
-          </a:stretch>
-        </p:blipFill>
-        <p:spPr bwMode="auto">
-          <a:xfrm>
-            <a:off x="2209800" y="1981200"/>
-            <a:ext cx="5896506" cy="3856037"/>
-          </a:xfrm>
-          <a:prstGeom prst="rect">
-            <a:avLst/>
-          </a:prstGeom>
-          <a:noFill/>
-          <a:ln w="9525">
-            <a:noFill/>
-            <a:miter lim="800000"/>
-            <a:headEnd/>
-            <a:tailEnd/>
-          </a:ln>
-          <a:effectLst/>
-        </p:spPr>
-      </p:pic>
-    </p:spTree>
-  </p:cSld>
-  <p:clrMapOvr>
-    <a:masterClrMapping/>
-  </p:clrMapOvr>
-  <p:transition/>
-  <p:timing>
-    <p:tnLst>
-      <p:par>
-        <p:cTn id="1" dur="indefinite" restart="never" nodeType="tmRoot"/>
-      </p:par>
-    </p:tnLst>
-  </p:timing>
-</p:sld>
-</file>
-
-<file path=ppt/slides/slide24.xml><?xml version="1.0" encoding="utf-8"?>
-<p:sld xmlns:a="http://schemas.openxmlformats.org/drawingml/2006/main" xmlns:r="http://schemas.openxmlformats.org/officeDocument/2006/relationships" xmlns:p="http://schemas.openxmlformats.org/presentationml/2006/main">
-  <p:cSld>
-    <p:spTree>
-      <p:nvGrpSpPr>
-        <p:cNvPr id="1" name=""/>
-        <p:cNvGrpSpPr/>
-        <p:nvPr/>
-      </p:nvGrpSpPr>
-      <p:grpSpPr>
-        <a:xfrm>
-          <a:off x="0" y="0"/>
-          <a:ext cx="0" cy="0"/>
-          <a:chOff x="0" y="0"/>
-          <a:chExt cx="0" cy="0"/>
-        </a:xfrm>
-      </p:grpSpPr>
-      <p:sp>
-        <p:nvSpPr>
-          <p:cNvPr id="2" name="Title 1"/>
-          <p:cNvSpPr>
-            <a:spLocks noGrp="1"/>
-          </p:cNvSpPr>
-          <p:nvPr>
-            <p:ph type="title"/>
-          </p:nvPr>
-        </p:nvSpPr>
-        <p:spPr/>
-        <p:txBody>
-          <a:bodyPr/>
-          <a:lstStyle/>
-          <a:p>
-            <a:r>
-              <a:rPr lang="en-US" dirty="0" smtClean="0"/>
-              <a:t>Usefulness At Lower Sampling Rates</a:t>
-            </a:r>
-            <a:endParaRPr lang="en-US" dirty="0"/>
-          </a:p>
-        </p:txBody>
-      </p:sp>
-      <p:sp>
-        <p:nvSpPr>
-          <p:cNvPr id="4" name="Slide Number Placeholder 3"/>
-          <p:cNvSpPr>
-            <a:spLocks noGrp="1"/>
-          </p:cNvSpPr>
-          <p:nvPr>
-            <p:ph type="sldNum" sz="quarter" idx="12"/>
-          </p:nvPr>
-        </p:nvSpPr>
-        <p:spPr/>
-        <p:txBody>
-          <a:bodyPr/>
-          <a:lstStyle/>
-          <a:p>
-            <a:fld id="{76AA3AEA-7752-4547-B37E-F079CFE3B3F4}" type="slidenum">
-              <a:rPr lang="en-US" smtClean="0"/>
-              <a:pPr/>
-              <a:t>24</a:t>
-            </a:fld>
-            <a:endParaRPr lang="en-US" dirty="0"/>
-          </a:p>
-        </p:txBody>
-      </p:sp>
-      <p:pic>
-        <p:nvPicPr>
-          <p:cNvPr id="44034" name="Picture 2"/>
-          <p:cNvPicPr>
-            <a:picLocks noChangeAspect="1" noChangeArrowheads="1"/>
-          </p:cNvPicPr>
-          <p:nvPr/>
-        </p:nvPicPr>
-        <p:blipFill>
-          <a:blip r:embed="rId3"/>
-          <a:srcRect/>
-          <a:stretch>
-            <a:fillRect/>
-          </a:stretch>
-        </p:blipFill>
-        <p:spPr bwMode="auto">
-          <a:xfrm>
-            <a:off x="1600200" y="1828800"/>
-            <a:ext cx="6557009" cy="4334256"/>
-          </a:xfrm>
-          <a:prstGeom prst="rect">
-            <a:avLst/>
-          </a:prstGeom>
-          <a:noFill/>
-          <a:ln w="9525">
-            <a:noFill/>
-            <a:miter lim="800000"/>
-            <a:headEnd/>
-            <a:tailEnd/>
-          </a:ln>
-          <a:effectLst/>
-        </p:spPr>
-      </p:pic>
-    </p:spTree>
-  </p:cSld>
-  <p:clrMapOvr>
-    <a:masterClrMapping/>
-  </p:clrMapOvr>
-  <p:transition/>
-  <p:timing>
-    <p:tnLst>
-      <p:par>
-        <p:cTn id="1" dur="indefinite" restart="never" nodeType="tmRoot"/>
-      </p:par>
-    </p:tnLst>
   </p:timing>
 </p:sld>
 </file>
@@ -21283,15 +21622,14 @@
           <a:p>
             <a:r>
               <a:rPr lang="en-US" dirty="0" smtClean="0"/>
-              <a:t>Partition executions into 2 sets </a:t>
-            </a:r>
-            <a:endParaRPr lang="en-US" dirty="0" smtClean="0"/>
+              <a:t>Each predicate partitions runs into 2 sets </a:t>
+            </a:r>
           </a:p>
           <a:p>
             <a:pPr lvl="1"/>
             <a:r>
               <a:rPr lang="en-US" dirty="0" smtClean="0"/>
-              <a:t>Executions where it was </a:t>
+              <a:t>Runs where it was </a:t>
             </a:r>
             <a:r>
               <a:rPr lang="en-US" i="1" dirty="0" smtClean="0"/>
@@ -21302,7 +21640,7 @@
             <a:pPr lvl="1"/>
             <a:r>
               <a:rPr lang="en-US" dirty="0" smtClean="0"/>
-              <a:t>Executions where it was </a:t>
+              <a:t>Runs where it was </a:t>
             </a:r>
             <a:r>
               <a:rPr lang="en-US" i="1" dirty="0" smtClean="0"/>
@@ -21319,11 +21657,7 @@
           <a:p>
             <a:r>
               <a:rPr lang="en-US" dirty="0" smtClean="0"/>
-              <a:t>Unfortunately</a:t>
-            </a:r>
-            <a:r>
-              <a:rPr lang="en-US" dirty="0" smtClean="0"/>
-              <a:t>, bugs are complex – They require a richer set of partitions</a:t>
+              <a:t>Unfortunately, bugs are complex – They require a richer set of partitions</a:t>
             </a:r>
           </a:p>
           <a:p>
@@ -23571,8 +23905,13 @@
             </a:r>
             <a:r>
               <a:rPr lang="en-US" dirty="0" smtClean="0"/>
-              <a:t>in a run if</a:t>
-            </a:r>
+              <a:t>in a run </a:t>
+            </a:r>
+            <a:r>
+              <a:rPr lang="en-US" dirty="0" err="1" smtClean="0"/>
+              <a:t>iff</a:t>
+            </a:r>
+            <a:endParaRPr lang="en-US" dirty="0" smtClean="0"/>
           </a:p>
           <a:p>
             <a:pPr lvl="1"/>

</xml_diff>